<commit_message>
add git introduction chapter
</commit_message>
<xml_diff>
--- a/01. Introduction/Presentation/Introduction.pptx
+++ b/01. Introduction/Presentation/Introduction.pptx
@@ -7,7 +7,7 @@
     <p:sldMasterId id="2147483672" r:id="rId3"/>
   </p:sldMasterIdLst>
   <p:notesMasterIdLst>
-    <p:notesMasterId r:id="rId10"/>
+    <p:notesMasterId r:id="rId9"/>
   </p:notesMasterIdLst>
   <p:sldIdLst>
     <p:sldId id="371" r:id="rId4"/>
@@ -15,7 +15,6 @@
     <p:sldId id="392" r:id="rId6"/>
     <p:sldId id="395" r:id="rId7"/>
     <p:sldId id="396" r:id="rId8"/>
-    <p:sldId id="397" r:id="rId9"/>
   </p:sldIdLst>
   <p:sldSz cx="12192000" cy="6858000"/>
   <p:notesSz cx="6858000" cy="9144000"/>
@@ -10472,15 +10471,6 @@
                 <a:latin typeface="Calibri" panose="020F0502020204030204" pitchFamily="34" charset="0"/>
               </a:rPr>
               <a:t>What are the different version control systems?</a:t>
-            </a:r>
-          </a:p>
-          <a:p>
-            <a:pPr eaLnBrk="1" hangingPunct="1"/>
-            <a:r>
-              <a:rPr lang="en-US" altLang="en-US" dirty="0">
-                <a:latin typeface="Calibri" panose="020F0502020204030204" pitchFamily="34" charset="0"/>
-              </a:rPr>
-              <a:t>What is Git?</a:t>
             </a:r>
           </a:p>
         </p:txBody>
@@ -14047,252 +14037,6 @@
     <p:extLst>
       <p:ext uri="{BB962C8B-B14F-4D97-AF65-F5344CB8AC3E}">
         <p14:creationId xmlns:p14="http://schemas.microsoft.com/office/powerpoint/2010/main" val="1235569791"/>
-      </p:ext>
-    </p:extLst>
-  </p:cSld>
-  <p:clrMapOvr>
-    <a:overrideClrMapping bg1="lt1" tx1="dk1" bg2="lt2" tx2="dk2" accent1="accent1" accent2="accent2" accent3="accent3" accent4="accent4" accent5="accent5" accent6="accent6" hlink="hlink" folHlink="folHlink"/>
-  </p:clrMapOvr>
-</p:sld>
-</file>
-
-<file path=ppt/slides/slide6.xml><?xml version="1.0" encoding="utf-8"?>
-<p:sld xmlns:a="http://schemas.openxmlformats.org/drawingml/2006/main" xmlns:r="http://schemas.openxmlformats.org/officeDocument/2006/relationships" xmlns:p="http://schemas.openxmlformats.org/presentationml/2006/main">
-  <p:cSld>
-    <p:bg>
-      <p:bgPr>
-        <a:solidFill>
-          <a:srgbClr val="B8D0CD"/>
-        </a:solidFill>
-        <a:effectLst/>
-      </p:bgPr>
-    </p:bg>
-    <p:spTree>
-      <p:nvGrpSpPr>
-        <p:cNvPr id="1" name=""/>
-        <p:cNvGrpSpPr/>
-        <p:nvPr/>
-      </p:nvGrpSpPr>
-      <p:grpSpPr>
-        <a:xfrm>
-          <a:off x="0" y="0"/>
-          <a:ext cx="0" cy="0"/>
-          <a:chOff x="0" y="0"/>
-          <a:chExt cx="0" cy="0"/>
-        </a:xfrm>
-      </p:grpSpPr>
-      <p:sp>
-        <p:nvSpPr>
-          <p:cNvPr id="2" name="Title 1">
-            <a:extLst>
-              <a:ext uri="{FF2B5EF4-FFF2-40B4-BE49-F238E27FC236}">
-                <a16:creationId xmlns:a16="http://schemas.microsoft.com/office/drawing/2014/main" id="{F75D0340-8CE0-F3FB-E4D9-39689E7622A7}"/>
-              </a:ext>
-            </a:extLst>
-          </p:cNvPr>
-          <p:cNvSpPr>
-            <a:spLocks noGrp="1"/>
-          </p:cNvSpPr>
-          <p:nvPr>
-            <p:ph type="title"/>
-          </p:nvPr>
-        </p:nvSpPr>
-        <p:spPr>
-          <a:xfrm>
-            <a:off x="838199" y="365125"/>
-            <a:ext cx="11353801" cy="1325563"/>
-          </a:xfrm>
-        </p:spPr>
-        <p:txBody>
-          <a:bodyPr/>
-          <a:lstStyle/>
-          <a:p>
-            <a:pPr eaLnBrk="1" hangingPunct="1"/>
-            <a:r>
-              <a:rPr lang="en-US" altLang="en-US" dirty="0">
-                <a:latin typeface="Calibri" panose="020F0502020204030204" pitchFamily="34" charset="0"/>
-              </a:rPr>
-              <a:t>What is Git?</a:t>
-            </a:r>
-            <a:endParaRPr lang="en-US" altLang="en-US" dirty="0"/>
-          </a:p>
-        </p:txBody>
-      </p:sp>
-      <p:sp>
-        <p:nvSpPr>
-          <p:cNvPr id="5" name="Content Placeholder 2">
-            <a:extLst>
-              <a:ext uri="{FF2B5EF4-FFF2-40B4-BE49-F238E27FC236}">
-                <a16:creationId xmlns:a16="http://schemas.microsoft.com/office/drawing/2014/main" id="{9E89BE17-59D2-1320-7115-EEDF0A59DE7E}"/>
-              </a:ext>
-            </a:extLst>
-          </p:cNvPr>
-          <p:cNvSpPr txBox="1">
-            <a:spLocks/>
-          </p:cNvSpPr>
-          <p:nvPr/>
-        </p:nvSpPr>
-        <p:spPr>
-          <a:xfrm>
-            <a:off x="991985" y="1690689"/>
-            <a:ext cx="10361816" cy="2759392"/>
-          </a:xfrm>
-          <a:prstGeom prst="rect">
-            <a:avLst/>
-          </a:prstGeom>
-        </p:spPr>
-        <p:txBody>
-          <a:bodyPr vert="horz" lIns="45720" tIns="45720" rIns="45720" bIns="45720" rtlCol="0">
-            <a:normAutofit/>
-          </a:bodyPr>
-          <a:lstStyle>
-            <a:lvl1pPr marL="228600" indent="-228600">
-              <a:lnSpc>
-                <a:spcPct val="90000"/>
-              </a:lnSpc>
-              <a:spcBef>
-                <a:spcPts val="1000"/>
-              </a:spcBef>
-              <a:buClr>
-                <a:schemeClr val="accent2"/>
-              </a:buClr>
-              <a:buFont typeface="Courier New" panose="02070309020205020404" pitchFamily="49" charset="0"/>
-              <a:buChar char="o"/>
-              <a:defRPr sz="2800">
-                <a:latin typeface="Calibri" panose="020F0502020204030204" pitchFamily="34" charset="0"/>
-              </a:defRPr>
-            </a:lvl1pPr>
-            <a:lvl2pPr marL="685800" indent="-228600">
-              <a:lnSpc>
-                <a:spcPct val="90000"/>
-              </a:lnSpc>
-              <a:spcBef>
-                <a:spcPts val="500"/>
-              </a:spcBef>
-              <a:buFont typeface="Arial" panose="020B0604020202020204" pitchFamily="34" charset="0"/>
-              <a:buChar char="•"/>
-              <a:defRPr sz="2400"/>
-            </a:lvl2pPr>
-            <a:lvl3pPr marL="1143000" indent="-228600">
-              <a:lnSpc>
-                <a:spcPct val="90000"/>
-              </a:lnSpc>
-              <a:spcBef>
-                <a:spcPts val="500"/>
-              </a:spcBef>
-              <a:buFont typeface="Arial" panose="020B0604020202020204" pitchFamily="34" charset="0"/>
-              <a:buChar char="•"/>
-              <a:defRPr sz="2000"/>
-            </a:lvl3pPr>
-            <a:lvl4pPr marL="1600200" indent="-228600">
-              <a:lnSpc>
-                <a:spcPct val="90000"/>
-              </a:lnSpc>
-              <a:spcBef>
-                <a:spcPts val="500"/>
-              </a:spcBef>
-              <a:buFont typeface="Arial" panose="020B0604020202020204" pitchFamily="34" charset="0"/>
-              <a:buChar char="•"/>
-            </a:lvl4pPr>
-            <a:lvl5pPr marL="2057400" indent="-228600">
-              <a:lnSpc>
-                <a:spcPct val="90000"/>
-              </a:lnSpc>
-              <a:spcBef>
-                <a:spcPts val="500"/>
-              </a:spcBef>
-              <a:buFont typeface="Arial" panose="020B0604020202020204" pitchFamily="34" charset="0"/>
-              <a:buChar char="•"/>
-            </a:lvl5pPr>
-            <a:lvl6pPr marL="2514600" indent="-228600">
-              <a:lnSpc>
-                <a:spcPct val="90000"/>
-              </a:lnSpc>
-              <a:spcBef>
-                <a:spcPts val="500"/>
-              </a:spcBef>
-              <a:buFont typeface="Arial" panose="020B0604020202020204" pitchFamily="34" charset="0"/>
-              <a:buChar char="•"/>
-            </a:lvl6pPr>
-            <a:lvl7pPr marL="2971800" indent="-228600">
-              <a:lnSpc>
-                <a:spcPct val="90000"/>
-              </a:lnSpc>
-              <a:spcBef>
-                <a:spcPts val="500"/>
-              </a:spcBef>
-              <a:buFont typeface="Arial" panose="020B0604020202020204" pitchFamily="34" charset="0"/>
-              <a:buChar char="•"/>
-            </a:lvl7pPr>
-            <a:lvl8pPr marL="3429000" indent="-228600">
-              <a:lnSpc>
-                <a:spcPct val="90000"/>
-              </a:lnSpc>
-              <a:spcBef>
-                <a:spcPts val="500"/>
-              </a:spcBef>
-              <a:buFont typeface="Arial" panose="020B0604020202020204" pitchFamily="34" charset="0"/>
-              <a:buChar char="•"/>
-            </a:lvl8pPr>
-            <a:lvl9pPr marL="3886200" indent="-228600">
-              <a:lnSpc>
-                <a:spcPct val="90000"/>
-              </a:lnSpc>
-              <a:spcBef>
-                <a:spcPts val="500"/>
-              </a:spcBef>
-              <a:buFont typeface="Arial" panose="020B0604020202020204" pitchFamily="34" charset="0"/>
-              <a:buChar char="•"/>
-            </a:lvl9pPr>
-          </a:lstStyle>
-          <a:p>
-            <a:r>
-              <a:rPr lang="en-US" dirty="0"/>
-              <a:t>Git is a Distributed Version Control System. Git was originally authored by Linus Torvalds. </a:t>
-            </a:r>
-          </a:p>
-          <a:p>
-            <a:r>
-              <a:rPr lang="en-US" dirty="0"/>
-              <a:t>It become the most widely used version control system due to its distributed nature, speed, and powerful features.</a:t>
-            </a:r>
-          </a:p>
-        </p:txBody>
-      </p:sp>
-      <p:pic>
-        <p:nvPicPr>
-          <p:cNvPr id="4" name="Picture 3" descr="A red and white logo&#10;&#10;Description automatically generated">
-            <a:extLst>
-              <a:ext uri="{FF2B5EF4-FFF2-40B4-BE49-F238E27FC236}">
-                <a16:creationId xmlns:a16="http://schemas.microsoft.com/office/drawing/2014/main" id="{F4245D95-1A82-10CB-E424-01C45181D42A}"/>
-              </a:ext>
-            </a:extLst>
-          </p:cNvPr>
-          <p:cNvPicPr>
-            <a:picLocks noChangeAspect="1"/>
-          </p:cNvPicPr>
-          <p:nvPr/>
-        </p:nvPicPr>
-        <p:blipFill>
-          <a:blip r:embed="rId3"/>
-          <a:stretch>
-            <a:fillRect/>
-          </a:stretch>
-        </p:blipFill>
-        <p:spPr>
-          <a:xfrm>
-            <a:off x="4023829" y="578343"/>
-            <a:ext cx="741564" cy="741564"/>
-          </a:xfrm>
-          <a:prstGeom prst="rect">
-            <a:avLst/>
-          </a:prstGeom>
-        </p:spPr>
-      </p:pic>
-    </p:spTree>
-    <p:extLst>
-      <p:ext uri="{BB962C8B-B14F-4D97-AF65-F5344CB8AC3E}">
-        <p14:creationId xmlns:p14="http://schemas.microsoft.com/office/powerpoint/2010/main" val="3166121293"/>
       </p:ext>
     </p:extLst>
   </p:cSld>
@@ -15652,47 +15396,4 @@
     </a:folHlink>
   </a:clrScheme>
 </a:themeOverride>
-</file>
-
-<file path=ppt/theme/themeOverride5.xml><?xml version="1.0" encoding="utf-8"?>
-<a:themeOverride xmlns:a="http://schemas.openxmlformats.org/drawingml/2006/main">
-  <a:clrScheme name="Office">
-    <a:dk1>
-      <a:sysClr val="windowText" lastClr="000000"/>
-    </a:dk1>
-    <a:lt1>
-      <a:sysClr val="window" lastClr="FFFFFF"/>
-    </a:lt1>
-    <a:dk2>
-      <a:srgbClr val="44546A"/>
-    </a:dk2>
-    <a:lt2>
-      <a:srgbClr val="E7E6E6"/>
-    </a:lt2>
-    <a:accent1>
-      <a:srgbClr val="4472C4"/>
-    </a:accent1>
-    <a:accent2>
-      <a:srgbClr val="ED7D31"/>
-    </a:accent2>
-    <a:accent3>
-      <a:srgbClr val="A5A5A5"/>
-    </a:accent3>
-    <a:accent4>
-      <a:srgbClr val="FFC000"/>
-    </a:accent4>
-    <a:accent5>
-      <a:srgbClr val="5B9BD5"/>
-    </a:accent5>
-    <a:accent6>
-      <a:srgbClr val="70AD47"/>
-    </a:accent6>
-    <a:hlink>
-      <a:srgbClr val="0563C1"/>
-    </a:hlink>
-    <a:folHlink>
-      <a:srgbClr val="954F72"/>
-    </a:folHlink>
-  </a:clrScheme>
-</a:themeOverride>
 </file>
</xml_diff>

<commit_message>
update branch concept more details
</commit_message>
<xml_diff>
--- a/01. Introduction/Presentation/Introduction.pptx
+++ b/01. Introduction/Presentation/Introduction.pptx
@@ -7,7 +7,7 @@
     <p:sldMasterId id="2147483672" r:id="rId3"/>
   </p:sldMasterIdLst>
   <p:notesMasterIdLst>
-    <p:notesMasterId r:id="rId9"/>
+    <p:notesMasterId r:id="rId10"/>
   </p:notesMasterIdLst>
   <p:sldIdLst>
     <p:sldId id="371" r:id="rId4"/>
@@ -15,6 +15,7 @@
     <p:sldId id="392" r:id="rId6"/>
     <p:sldId id="395" r:id="rId7"/>
     <p:sldId id="396" r:id="rId8"/>
+    <p:sldId id="397" r:id="rId9"/>
   </p:sldIdLst>
   <p:sldSz cx="12192000" cy="6858000"/>
   <p:notesSz cx="6858000" cy="9144000"/>
@@ -203,7 +204,7 @@
           <a:p>
             <a:fld id="{7387BF4C-1AC5-8047-9CB7-F6FE835C9ED7}" type="datetimeFigureOut">
               <a:rPr lang="en-US" smtClean="0"/>
-              <a:t>7/16/23</a:t>
+              <a:t>9/3/23</a:t>
             </a:fld>
             <a:endParaRPr lang="en-US"/>
           </a:p>
@@ -705,7 +706,7 @@
           <a:p>
             <a:fld id="{490E0566-2D9A-8349-94CE-22DF369B8F30}" type="datetime1">
               <a:rPr lang="en-US" smtClean="0"/>
-              <a:t>7/16/23</a:t>
+              <a:t>9/3/23</a:t>
             </a:fld>
             <a:endParaRPr lang="en-US"/>
           </a:p>
@@ -906,7 +907,7 @@
           <a:p>
             <a:fld id="{77D82A1C-DCCB-F942-B4C8-2616E50FC610}" type="datetime1">
               <a:rPr lang="en-US" smtClean="0"/>
-              <a:t>7/16/23</a:t>
+              <a:t>9/3/23</a:t>
             </a:fld>
             <a:endParaRPr lang="en-US"/>
           </a:p>
@@ -1117,7 +1118,7 @@
           <a:p>
             <a:fld id="{047ECBFF-73A1-A944-AFD4-F359C9557B10}" type="datetime1">
               <a:rPr lang="en-US" smtClean="0"/>
-              <a:t>7/16/23</a:t>
+              <a:t>9/3/23</a:t>
             </a:fld>
             <a:endParaRPr lang="en-US"/>
           </a:p>
@@ -1340,7 +1341,7 @@
           <a:p>
             <a:fld id="{490E0566-2D9A-8349-94CE-22DF369B8F30}" type="datetime1">
               <a:rPr lang="en-US" smtClean="0"/>
-              <a:t>7/16/23</a:t>
+              <a:t>9/3/23</a:t>
             </a:fld>
             <a:endParaRPr lang="en-US"/>
           </a:p>
@@ -1541,7 +1542,7 @@
           <a:p>
             <a:fld id="{F4C6DED6-70D8-F640-A3FF-0DAAD5020B2E}" type="datetime1">
               <a:rPr lang="en-US" smtClean="0"/>
-              <a:t>7/16/23</a:t>
+              <a:t>9/3/23</a:t>
             </a:fld>
             <a:endParaRPr lang="en-US"/>
           </a:p>
@@ -1819,7 +1820,7 @@
           <a:p>
             <a:fld id="{315BBD7F-BEBD-8A4D-8771-D6866751C9CB}" type="datetime1">
               <a:rPr lang="en-US" smtClean="0"/>
-              <a:t>7/16/23</a:t>
+              <a:t>9/3/23</a:t>
             </a:fld>
             <a:endParaRPr lang="en-US"/>
           </a:p>
@@ -2087,7 +2088,7 @@
           <a:p>
             <a:fld id="{732B2173-0BAA-D644-B2E1-15CD564136DA}" type="datetime1">
               <a:rPr lang="en-US" smtClean="0"/>
-              <a:t>7/16/23</a:t>
+              <a:t>9/3/23</a:t>
             </a:fld>
             <a:endParaRPr lang="en-US"/>
           </a:p>
@@ -2502,7 +2503,7 @@
           <a:p>
             <a:fld id="{460457B8-75DE-F14E-B35F-7D7AA7D67DC5}" type="datetime1">
               <a:rPr lang="en-US" smtClean="0"/>
-              <a:t>7/16/23</a:t>
+              <a:t>9/3/23</a:t>
             </a:fld>
             <a:endParaRPr lang="en-US"/>
           </a:p>
@@ -2646,7 +2647,7 @@
           <a:p>
             <a:fld id="{99E91BB6-5CF1-E946-8756-B969CA4EAC90}" type="datetime1">
               <a:rPr lang="en-US" smtClean="0"/>
-              <a:t>7/16/23</a:t>
+              <a:t>9/3/23</a:t>
             </a:fld>
             <a:endParaRPr lang="en-US"/>
           </a:p>
@@ -2762,7 +2763,7 @@
           <a:p>
             <a:fld id="{D3592C8E-4E5B-8D4D-9A2C-ED2D4214E42D}" type="datetime1">
               <a:rPr lang="en-US" smtClean="0"/>
-              <a:t>7/16/23</a:t>
+              <a:t>9/3/23</a:t>
             </a:fld>
             <a:endParaRPr lang="en-US"/>
           </a:p>
@@ -3076,7 +3077,7 @@
           <a:p>
             <a:fld id="{A185CA14-CC43-E04C-A1B9-DA538B78C78B}" type="datetime1">
               <a:rPr lang="en-US" smtClean="0"/>
-              <a:t>7/16/23</a:t>
+              <a:t>9/3/23</a:t>
             </a:fld>
             <a:endParaRPr lang="en-US"/>
           </a:p>
@@ -3277,7 +3278,7 @@
           <a:p>
             <a:fld id="{F4C6DED6-70D8-F640-A3FF-0DAAD5020B2E}" type="datetime1">
               <a:rPr lang="en-US" smtClean="0"/>
-              <a:t>7/16/23</a:t>
+              <a:t>9/3/23</a:t>
             </a:fld>
             <a:endParaRPr lang="en-US"/>
           </a:p>
@@ -3568,7 +3569,7 @@
           <a:p>
             <a:fld id="{7BFD17D5-B327-1746-9545-80B79DBEEDDD}" type="datetime1">
               <a:rPr lang="en-US" smtClean="0"/>
-              <a:t>7/16/23</a:t>
+              <a:t>9/3/23</a:t>
             </a:fld>
             <a:endParaRPr lang="en-US"/>
           </a:p>
@@ -3769,7 +3770,7 @@
           <a:p>
             <a:fld id="{77D82A1C-DCCB-F942-B4C8-2616E50FC610}" type="datetime1">
               <a:rPr lang="en-US" smtClean="0"/>
-              <a:t>7/16/23</a:t>
+              <a:t>9/3/23</a:t>
             </a:fld>
             <a:endParaRPr lang="en-US"/>
           </a:p>
@@ -3980,7 +3981,7 @@
           <a:p>
             <a:fld id="{047ECBFF-73A1-A944-AFD4-F359C9557B10}" type="datetime1">
               <a:rPr lang="en-US" smtClean="0"/>
-              <a:t>7/16/23</a:t>
+              <a:t>9/3/23</a:t>
             </a:fld>
             <a:endParaRPr lang="en-US"/>
           </a:p>
@@ -4203,7 +4204,7 @@
           <a:p>
             <a:fld id="{490E0566-2D9A-8349-94CE-22DF369B8F30}" type="datetime1">
               <a:rPr lang="en-US" smtClean="0"/>
-              <a:t>7/16/23</a:t>
+              <a:t>9/3/23</a:t>
             </a:fld>
             <a:endParaRPr lang="en-US"/>
           </a:p>
@@ -4404,7 +4405,7 @@
           <a:p>
             <a:fld id="{F4C6DED6-70D8-F640-A3FF-0DAAD5020B2E}" type="datetime1">
               <a:rPr lang="en-US" smtClean="0"/>
-              <a:t>7/16/23</a:t>
+              <a:t>9/3/23</a:t>
             </a:fld>
             <a:endParaRPr lang="en-US"/>
           </a:p>
@@ -4682,7 +4683,7 @@
           <a:p>
             <a:fld id="{315BBD7F-BEBD-8A4D-8771-D6866751C9CB}" type="datetime1">
               <a:rPr lang="en-US" smtClean="0"/>
-              <a:t>7/16/23</a:t>
+              <a:t>9/3/23</a:t>
             </a:fld>
             <a:endParaRPr lang="en-US"/>
           </a:p>
@@ -4950,7 +4951,7 @@
           <a:p>
             <a:fld id="{732B2173-0BAA-D644-B2E1-15CD564136DA}" type="datetime1">
               <a:rPr lang="en-US" smtClean="0"/>
-              <a:t>7/16/23</a:t>
+              <a:t>9/3/23</a:t>
             </a:fld>
             <a:endParaRPr lang="en-US"/>
           </a:p>
@@ -5365,7 +5366,7 @@
           <a:p>
             <a:fld id="{460457B8-75DE-F14E-B35F-7D7AA7D67DC5}" type="datetime1">
               <a:rPr lang="en-US" smtClean="0"/>
-              <a:t>7/16/23</a:t>
+              <a:t>9/3/23</a:t>
             </a:fld>
             <a:endParaRPr lang="en-US"/>
           </a:p>
@@ -5509,7 +5510,7 @@
           <a:p>
             <a:fld id="{99E91BB6-5CF1-E946-8756-B969CA4EAC90}" type="datetime1">
               <a:rPr lang="en-US" smtClean="0"/>
-              <a:t>7/16/23</a:t>
+              <a:t>9/3/23</a:t>
             </a:fld>
             <a:endParaRPr lang="en-US"/>
           </a:p>
@@ -5625,7 +5626,7 @@
           <a:p>
             <a:fld id="{D3592C8E-4E5B-8D4D-9A2C-ED2D4214E42D}" type="datetime1">
               <a:rPr lang="en-US" smtClean="0"/>
-              <a:t>7/16/23</a:t>
+              <a:t>9/3/23</a:t>
             </a:fld>
             <a:endParaRPr lang="en-US"/>
           </a:p>
@@ -5903,7 +5904,7 @@
           <a:p>
             <a:fld id="{315BBD7F-BEBD-8A4D-8771-D6866751C9CB}" type="datetime1">
               <a:rPr lang="en-US" smtClean="0"/>
-              <a:t>7/16/23</a:t>
+              <a:t>9/3/23</a:t>
             </a:fld>
             <a:endParaRPr lang="en-US"/>
           </a:p>
@@ -6217,7 +6218,7 @@
           <a:p>
             <a:fld id="{A185CA14-CC43-E04C-A1B9-DA538B78C78B}" type="datetime1">
               <a:rPr lang="en-US" smtClean="0"/>
-              <a:t>7/16/23</a:t>
+              <a:t>9/3/23</a:t>
             </a:fld>
             <a:endParaRPr lang="en-US"/>
           </a:p>
@@ -6508,7 +6509,7 @@
           <a:p>
             <a:fld id="{7BFD17D5-B327-1746-9545-80B79DBEEDDD}" type="datetime1">
               <a:rPr lang="en-US" smtClean="0"/>
-              <a:t>7/16/23</a:t>
+              <a:t>9/3/23</a:t>
             </a:fld>
             <a:endParaRPr lang="en-US"/>
           </a:p>
@@ -6709,7 +6710,7 @@
           <a:p>
             <a:fld id="{77D82A1C-DCCB-F942-B4C8-2616E50FC610}" type="datetime1">
               <a:rPr lang="en-US" smtClean="0"/>
-              <a:t>7/16/23</a:t>
+              <a:t>9/3/23</a:t>
             </a:fld>
             <a:endParaRPr lang="en-US"/>
           </a:p>
@@ -6920,7 +6921,7 @@
           <a:p>
             <a:fld id="{047ECBFF-73A1-A944-AFD4-F359C9557B10}" type="datetime1">
               <a:rPr lang="en-US" smtClean="0"/>
-              <a:t>7/16/23</a:t>
+              <a:t>9/3/23</a:t>
             </a:fld>
             <a:endParaRPr lang="en-US"/>
           </a:p>
@@ -7188,7 +7189,7 @@
           <a:p>
             <a:fld id="{732B2173-0BAA-D644-B2E1-15CD564136DA}" type="datetime1">
               <a:rPr lang="en-US" smtClean="0"/>
-              <a:t>7/16/23</a:t>
+              <a:t>9/3/23</a:t>
             </a:fld>
             <a:endParaRPr lang="en-US"/>
           </a:p>
@@ -7603,7 +7604,7 @@
           <a:p>
             <a:fld id="{460457B8-75DE-F14E-B35F-7D7AA7D67DC5}" type="datetime1">
               <a:rPr lang="en-US" smtClean="0"/>
-              <a:t>7/16/23</a:t>
+              <a:t>9/3/23</a:t>
             </a:fld>
             <a:endParaRPr lang="en-US"/>
           </a:p>
@@ -7747,7 +7748,7 @@
           <a:p>
             <a:fld id="{99E91BB6-5CF1-E946-8756-B969CA4EAC90}" type="datetime1">
               <a:rPr lang="en-US" smtClean="0"/>
-              <a:t>7/16/23</a:t>
+              <a:t>9/3/23</a:t>
             </a:fld>
             <a:endParaRPr lang="en-US"/>
           </a:p>
@@ -7863,7 +7864,7 @@
           <a:p>
             <a:fld id="{D3592C8E-4E5B-8D4D-9A2C-ED2D4214E42D}" type="datetime1">
               <a:rPr lang="en-US" smtClean="0"/>
-              <a:t>7/16/23</a:t>
+              <a:t>9/3/23</a:t>
             </a:fld>
             <a:endParaRPr lang="en-US"/>
           </a:p>
@@ -8177,7 +8178,7 @@
           <a:p>
             <a:fld id="{A185CA14-CC43-E04C-A1B9-DA538B78C78B}" type="datetime1">
               <a:rPr lang="en-US" smtClean="0"/>
-              <a:t>7/16/23</a:t>
+              <a:t>9/3/23</a:t>
             </a:fld>
             <a:endParaRPr lang="en-US"/>
           </a:p>
@@ -8468,7 +8469,7 @@
           <a:p>
             <a:fld id="{7BFD17D5-B327-1746-9545-80B79DBEEDDD}" type="datetime1">
               <a:rPr lang="en-US" smtClean="0"/>
-              <a:t>7/16/23</a:t>
+              <a:t>9/3/23</a:t>
             </a:fld>
             <a:endParaRPr lang="en-US"/>
           </a:p>
@@ -8715,7 +8716,7 @@
           <a:p>
             <a:fld id="{0362EEAF-02AB-9644-9FA5-CC38EBED914C}" type="datetime1">
               <a:rPr lang="en-US" smtClean="0"/>
-              <a:t>7/16/23</a:t>
+              <a:t>9/3/23</a:t>
             </a:fld>
             <a:endParaRPr lang="en-US"/>
           </a:p>
@@ -9290,7 +9291,7 @@
           <a:p>
             <a:fld id="{0362EEAF-02AB-9644-9FA5-CC38EBED914C}" type="datetime1">
               <a:rPr lang="en-US" smtClean="0"/>
-              <a:t>7/16/23</a:t>
+              <a:t>9/3/23</a:t>
             </a:fld>
             <a:endParaRPr lang="en-US"/>
           </a:p>
@@ -9865,7 +9866,7 @@
           <a:p>
             <a:fld id="{0362EEAF-02AB-9644-9FA5-CC38EBED914C}" type="datetime1">
               <a:rPr lang="en-US" smtClean="0"/>
-              <a:t>7/16/23</a:t>
+              <a:t>9/3/23</a:t>
             </a:fld>
             <a:endParaRPr lang="en-US"/>
           </a:p>
@@ -10438,7 +10439,7 @@
         </p:nvSpPr>
         <p:spPr>
           <a:xfrm>
-            <a:off x="1981200" y="2590801"/>
+            <a:off x="1943100" y="1866406"/>
             <a:ext cx="8305800" cy="3681984"/>
           </a:xfrm>
         </p:spPr>
@@ -12624,7 +12625,7 @@
         </p:spPr>
         <p:txBody>
           <a:bodyPr vert="horz" lIns="45720" tIns="45720" rIns="45720" bIns="45720" rtlCol="0">
-            <a:normAutofit fontScale="92500" lnSpcReduction="20000"/>
+            <a:normAutofit/>
           </a:bodyPr>
           <a:lstStyle>
             <a:lvl1pPr marL="228600" indent="-228600">
@@ -12747,30 +12748,6 @@
               <a:t>Concurrent Versions System (CVS), Apache Subversion (SVN).</a:t>
             </a:r>
           </a:p>
-          <a:p>
-            <a:endParaRPr lang="en-US" dirty="0"/>
-          </a:p>
-          <a:p>
-            <a:r>
-              <a:rPr lang="en-US" dirty="0"/>
-              <a:t>Distributed Version Control Systems (DVCS):</a:t>
-            </a:r>
-          </a:p>
-          <a:p>
-            <a:pPr marL="0" indent="0">
-              <a:buNone/>
-            </a:pPr>
-            <a:r>
-              <a:rPr lang="en-US" dirty="0"/>
-              <a:t>Each developer has a complete copy of the codebase, including its full history, on their local machine.</a:t>
-            </a:r>
-          </a:p>
-          <a:p>
-            <a:r>
-              <a:rPr lang="en-US" dirty="0"/>
-              <a:t>Git, Mercurial.</a:t>
-            </a:r>
-          </a:p>
         </p:txBody>
       </p:sp>
       <p:pic>
@@ -12801,7 +12778,7 @@
         </p:blipFill>
         <p:spPr>
           <a:xfrm>
-            <a:off x="7220640" y="2477306"/>
+            <a:off x="7040293" y="3556614"/>
             <a:ext cx="951694" cy="951694"/>
           </a:xfrm>
           <a:prstGeom prst="rect">
@@ -12811,10 +12788,10 @@
       </p:pic>
       <p:pic>
         <p:nvPicPr>
-          <p:cNvPr id="12" name="Graphic 11" descr="Server with solid fill">
-            <a:extLst>
-              <a:ext uri="{FF2B5EF4-FFF2-40B4-BE49-F238E27FC236}">
-                <a16:creationId xmlns:a16="http://schemas.microsoft.com/office/drawing/2014/main" id="{B8E0EDC3-F20F-58F8-59D7-568ED11BBE5E}"/>
+          <p:cNvPr id="14" name="Graphic 13" descr="Programmer male outline">
+            <a:extLst>
+              <a:ext uri="{FF2B5EF4-FFF2-40B4-BE49-F238E27FC236}">
+                <a16:creationId xmlns:a16="http://schemas.microsoft.com/office/drawing/2014/main" id="{9DB51579-F7E9-3CC5-D8CB-AD1D838E9C1B}"/>
               </a:ext>
             </a:extLst>
           </p:cNvPr>
@@ -12824,10 +12801,10 @@
           <p:nvPr/>
         </p:nvPicPr>
         <p:blipFill>
-          <a:blip r:embed="rId3">
+          <a:blip r:embed="rId5">
             <a:extLst>
               <a:ext uri="{96DAC541-7B7A-43D3-8B79-37D633B846F1}">
-                <asvg:svgBlip xmlns:asvg="http://schemas.microsoft.com/office/drawing/2016/SVG/main" r:embed="rId4"/>
+                <asvg:svgBlip xmlns:asvg="http://schemas.microsoft.com/office/drawing/2016/SVG/main" r:embed="rId6"/>
               </a:ext>
             </a:extLst>
           </a:blip>
@@ -12837,43 +12814,7 @@
         </p:blipFill>
         <p:spPr>
           <a:xfrm>
-            <a:off x="7276974" y="5073603"/>
-            <a:ext cx="914400" cy="914400"/>
-          </a:xfrm>
-          <a:prstGeom prst="rect">
-            <a:avLst/>
-          </a:prstGeom>
-        </p:spPr>
-      </p:pic>
-      <p:pic>
-        <p:nvPicPr>
-          <p:cNvPr id="14" name="Graphic 13" descr="Programmer male outline">
-            <a:extLst>
-              <a:ext uri="{FF2B5EF4-FFF2-40B4-BE49-F238E27FC236}">
-                <a16:creationId xmlns:a16="http://schemas.microsoft.com/office/drawing/2014/main" id="{9DB51579-F7E9-3CC5-D8CB-AD1D838E9C1B}"/>
-              </a:ext>
-            </a:extLst>
-          </p:cNvPr>
-          <p:cNvPicPr>
-            <a:picLocks noChangeAspect="1"/>
-          </p:cNvPicPr>
-          <p:nvPr/>
-        </p:nvPicPr>
-        <p:blipFill>
-          <a:blip r:embed="rId5">
-            <a:extLst>
-              <a:ext uri="{96DAC541-7B7A-43D3-8B79-37D633B846F1}">
-                <asvg:svgBlip xmlns:asvg="http://schemas.microsoft.com/office/drawing/2016/SVG/main" r:embed="rId6"/>
-              </a:ext>
-            </a:extLst>
-          </a:blip>
-          <a:stretch>
-            <a:fillRect/>
-          </a:stretch>
-        </p:blipFill>
-        <p:spPr>
-          <a:xfrm>
-            <a:off x="9113519" y="1606549"/>
+            <a:off x="9826201" y="2032816"/>
             <a:ext cx="526099" cy="526099"/>
           </a:xfrm>
           <a:prstGeom prst="rect">
@@ -12909,7 +12850,7 @@
         </p:blipFill>
         <p:spPr>
           <a:xfrm>
-            <a:off x="9913744" y="2429571"/>
+            <a:off x="10278954" y="3753625"/>
             <a:ext cx="526097" cy="526097"/>
           </a:xfrm>
           <a:prstGeom prst="rect">
@@ -12945,7 +12886,7 @@
         </p:blipFill>
         <p:spPr>
           <a:xfrm>
-            <a:off x="9133868" y="3224079"/>
+            <a:off x="9807915" y="5260788"/>
             <a:ext cx="526098" cy="526098"/>
           </a:xfrm>
           <a:prstGeom prst="rect">
@@ -12981,7 +12922,7 @@
         </p:blipFill>
         <p:spPr>
           <a:xfrm>
-            <a:off x="9509565" y="1520980"/>
+            <a:off x="10843529" y="3769411"/>
             <a:ext cx="526099" cy="526099"/>
           </a:xfrm>
           <a:prstGeom prst="rect">
@@ -12991,10 +12932,10 @@
       </p:pic>
       <p:pic>
         <p:nvPicPr>
-          <p:cNvPr id="25" name="Graphic 24" descr="Arrow Right with solid fill">
-            <a:extLst>
-              <a:ext uri="{FF2B5EF4-FFF2-40B4-BE49-F238E27FC236}">
-                <a16:creationId xmlns:a16="http://schemas.microsoft.com/office/drawing/2014/main" id="{11395C25-7919-67EA-C55D-B5CAE3B81C73}"/>
+          <p:cNvPr id="33" name="Graphic 32" descr="Arrow Right with solid fill">
+            <a:extLst>
+              <a:ext uri="{FF2B5EF4-FFF2-40B4-BE49-F238E27FC236}">
+                <a16:creationId xmlns:a16="http://schemas.microsoft.com/office/drawing/2014/main" id="{2D4FF922-D123-ED3D-9FFF-A2A1A526F11A}"/>
               </a:ext>
             </a:extLst>
           </p:cNvPr>
@@ -13016,189 +12957,9 @@
           </a:stretch>
         </p:blipFill>
         <p:spPr>
-          <a:xfrm rot="20906511">
-            <a:off x="8197428" y="1795033"/>
-            <a:ext cx="840305" cy="526100"/>
-          </a:xfrm>
-          <a:prstGeom prst="rect">
-            <a:avLst/>
-          </a:prstGeom>
-        </p:spPr>
-      </p:pic>
-      <p:pic>
-        <p:nvPicPr>
-          <p:cNvPr id="29" name="Graphic 28" descr="Arrow Right with solid fill">
-            <a:extLst>
-              <a:ext uri="{FF2B5EF4-FFF2-40B4-BE49-F238E27FC236}">
-                <a16:creationId xmlns:a16="http://schemas.microsoft.com/office/drawing/2014/main" id="{C92A0E67-A689-E8E5-2E19-1B8CA38B787A}"/>
-              </a:ext>
-            </a:extLst>
-          </p:cNvPr>
-          <p:cNvPicPr>
-            <a:picLocks noChangeAspect="1"/>
-          </p:cNvPicPr>
-          <p:nvPr/>
-        </p:nvPicPr>
-        <p:blipFill>
-          <a:blip r:embed="rId13">
-            <a:extLst>
-              <a:ext uri="{96DAC541-7B7A-43D3-8B79-37D633B846F1}">
-                <asvg:svgBlip xmlns:asvg="http://schemas.microsoft.com/office/drawing/2016/SVG/main" r:embed="rId14"/>
-              </a:ext>
-            </a:extLst>
-          </a:blip>
-          <a:stretch>
-            <a:fillRect/>
-          </a:stretch>
-        </p:blipFill>
-        <p:spPr>
-          <a:xfrm rot="10169661">
-            <a:off x="8232294" y="1991549"/>
-            <a:ext cx="840305" cy="526100"/>
-          </a:xfrm>
-          <a:prstGeom prst="rect">
-            <a:avLst/>
-          </a:prstGeom>
-        </p:spPr>
-      </p:pic>
-      <p:pic>
-        <p:nvPicPr>
-          <p:cNvPr id="30" name="Graphic 29" descr="Arrow Right with solid fill">
-            <a:extLst>
-              <a:ext uri="{FF2B5EF4-FFF2-40B4-BE49-F238E27FC236}">
-                <a16:creationId xmlns:a16="http://schemas.microsoft.com/office/drawing/2014/main" id="{FE5B7AE2-E559-5BDB-1043-B5544E879B78}"/>
-              </a:ext>
-            </a:extLst>
-          </p:cNvPr>
-          <p:cNvPicPr>
-            <a:picLocks noChangeAspect="1"/>
-          </p:cNvPicPr>
-          <p:nvPr/>
-        </p:nvPicPr>
-        <p:blipFill>
-          <a:blip r:embed="rId13">
-            <a:extLst>
-              <a:ext uri="{96DAC541-7B7A-43D3-8B79-37D633B846F1}">
-                <asvg:svgBlip xmlns:asvg="http://schemas.microsoft.com/office/drawing/2016/SVG/main" r:embed="rId14"/>
-              </a:ext>
-            </a:extLst>
-          </a:blip>
-          <a:stretch>
-            <a:fillRect/>
-          </a:stretch>
-        </p:blipFill>
-        <p:spPr>
-          <a:xfrm rot="10800000">
-            <a:off x="8231343" y="2602071"/>
-            <a:ext cx="1683131" cy="526100"/>
-          </a:xfrm>
-          <a:prstGeom prst="rect">
-            <a:avLst/>
-          </a:prstGeom>
-        </p:spPr>
-      </p:pic>
-      <p:pic>
-        <p:nvPicPr>
-          <p:cNvPr id="31" name="Graphic 30" descr="Arrow Right with solid fill">
-            <a:extLst>
-              <a:ext uri="{FF2B5EF4-FFF2-40B4-BE49-F238E27FC236}">
-                <a16:creationId xmlns:a16="http://schemas.microsoft.com/office/drawing/2014/main" id="{007B55CB-B664-FEAA-83D5-80E59C38DBC6}"/>
-              </a:ext>
-            </a:extLst>
-          </p:cNvPr>
-          <p:cNvPicPr>
-            <a:picLocks noChangeAspect="1"/>
-          </p:cNvPicPr>
-          <p:nvPr/>
-        </p:nvPicPr>
-        <p:blipFill>
-          <a:blip r:embed="rId13">
-            <a:extLst>
-              <a:ext uri="{96DAC541-7B7A-43D3-8B79-37D633B846F1}">
-                <asvg:svgBlip xmlns:asvg="http://schemas.microsoft.com/office/drawing/2016/SVG/main" r:embed="rId14"/>
-              </a:ext>
-            </a:extLst>
-          </a:blip>
-          <a:stretch>
-            <a:fillRect/>
-          </a:stretch>
-        </p:blipFill>
-        <p:spPr>
-          <a:xfrm>
-            <a:off x="8292303" y="2464911"/>
-            <a:ext cx="1683131" cy="526100"/>
-          </a:xfrm>
-          <a:prstGeom prst="rect">
-            <a:avLst/>
-          </a:prstGeom>
-        </p:spPr>
-      </p:pic>
-      <p:pic>
-        <p:nvPicPr>
-          <p:cNvPr id="32" name="Graphic 31" descr="Arrow Right with solid fill">
-            <a:extLst>
-              <a:ext uri="{FF2B5EF4-FFF2-40B4-BE49-F238E27FC236}">
-                <a16:creationId xmlns:a16="http://schemas.microsoft.com/office/drawing/2014/main" id="{3FB83409-E7A8-A3B5-F503-84109DD8E851}"/>
-              </a:ext>
-            </a:extLst>
-          </p:cNvPr>
-          <p:cNvPicPr>
-            <a:picLocks noChangeAspect="1"/>
-          </p:cNvPicPr>
-          <p:nvPr/>
-        </p:nvPicPr>
-        <p:blipFill>
-          <a:blip r:embed="rId13">
-            <a:extLst>
-              <a:ext uri="{96DAC541-7B7A-43D3-8B79-37D633B846F1}">
-                <asvg:svgBlip xmlns:asvg="http://schemas.microsoft.com/office/drawing/2016/SVG/main" r:embed="rId14"/>
-              </a:ext>
-            </a:extLst>
-          </a:blip>
-          <a:stretch>
-            <a:fillRect/>
-          </a:stretch>
-        </p:blipFill>
-        <p:spPr>
-          <a:xfrm rot="11902614">
-            <a:off x="8174244" y="3247662"/>
-            <a:ext cx="840305" cy="526100"/>
-          </a:xfrm>
-          <a:prstGeom prst="rect">
-            <a:avLst/>
-          </a:prstGeom>
-        </p:spPr>
-      </p:pic>
-      <p:pic>
-        <p:nvPicPr>
-          <p:cNvPr id="33" name="Graphic 32" descr="Arrow Right with solid fill">
-            <a:extLst>
-              <a:ext uri="{FF2B5EF4-FFF2-40B4-BE49-F238E27FC236}">
-                <a16:creationId xmlns:a16="http://schemas.microsoft.com/office/drawing/2014/main" id="{2D4FF922-D123-ED3D-9FFF-A2A1A526F11A}"/>
-              </a:ext>
-            </a:extLst>
-          </p:cNvPr>
-          <p:cNvPicPr>
-            <a:picLocks noChangeAspect="1"/>
-          </p:cNvPicPr>
-          <p:nvPr/>
-        </p:nvPicPr>
-        <p:blipFill>
-          <a:blip r:embed="rId13">
-            <a:extLst>
-              <a:ext uri="{96DAC541-7B7A-43D3-8B79-37D633B846F1}">
-                <asvg:svgBlip xmlns:asvg="http://schemas.microsoft.com/office/drawing/2016/SVG/main" r:embed="rId14"/>
-              </a:ext>
-            </a:extLst>
-          </a:blip>
-          <a:stretch>
-            <a:fillRect/>
-          </a:stretch>
-        </p:blipFill>
-        <p:spPr>
-          <a:xfrm rot="1139683">
-            <a:off x="8321024" y="3110134"/>
-            <a:ext cx="840305" cy="526100"/>
+          <a:xfrm rot="1556356">
+            <a:off x="7959606" y="4764470"/>
+            <a:ext cx="1844438" cy="526100"/>
           </a:xfrm>
           <a:prstGeom prst="rect">
             <a:avLst/>
@@ -13233,7 +12994,7 @@
         </p:blipFill>
         <p:spPr>
           <a:xfrm>
-            <a:off x="7096917" y="1877370"/>
+            <a:off x="7070447" y="3016776"/>
             <a:ext cx="526099" cy="526099"/>
           </a:xfrm>
           <a:prstGeom prst="rect">
@@ -13269,7 +13030,7 @@
         </p:blipFill>
         <p:spPr>
           <a:xfrm>
-            <a:off x="7353297" y="1891109"/>
+            <a:off x="7326827" y="3030515"/>
             <a:ext cx="526099" cy="526099"/>
           </a:xfrm>
           <a:prstGeom prst="rect">
@@ -13279,10 +13040,10 @@
       </p:pic>
       <p:pic>
         <p:nvPicPr>
-          <p:cNvPr id="38" name="Graphic 37" descr="Programmer male outline">
-            <a:extLst>
-              <a:ext uri="{FF2B5EF4-FFF2-40B4-BE49-F238E27FC236}">
-                <a16:creationId xmlns:a16="http://schemas.microsoft.com/office/drawing/2014/main" id="{FDEC3891-9574-6251-8ABF-7E53D964F8E3}"/>
+          <p:cNvPr id="3" name="Graphic 2" descr="Arrow Right with solid fill">
+            <a:extLst>
+              <a:ext uri="{FF2B5EF4-FFF2-40B4-BE49-F238E27FC236}">
+                <a16:creationId xmlns:a16="http://schemas.microsoft.com/office/drawing/2014/main" id="{C11CEDCD-1834-B342-CA7D-4D1D6B211828}"/>
               </a:ext>
             </a:extLst>
           </p:cNvPr>
@@ -13292,10 +13053,10 @@
           <p:nvPr/>
         </p:nvPicPr>
         <p:blipFill>
-          <a:blip r:embed="rId5">
+          <a:blip r:embed="rId13">
             <a:extLst>
               <a:ext uri="{96DAC541-7B7A-43D3-8B79-37D633B846F1}">
-                <asvg:svgBlip xmlns:asvg="http://schemas.microsoft.com/office/drawing/2016/SVG/main" r:embed="rId6"/>
+                <asvg:svgBlip xmlns:asvg="http://schemas.microsoft.com/office/drawing/2016/SVG/main" r:embed="rId14"/>
               </a:ext>
             </a:extLst>
           </a:blip>
@@ -13304,9 +13065,9 @@
           </a:stretch>
         </p:blipFill>
         <p:spPr>
-          <a:xfrm>
-            <a:off x="9196230" y="4279290"/>
-            <a:ext cx="526099" cy="526099"/>
+          <a:xfrm rot="12257988">
+            <a:off x="7844777" y="4871589"/>
+            <a:ext cx="1844438" cy="526100"/>
           </a:xfrm>
           <a:prstGeom prst="rect">
             <a:avLst/>
@@ -13315,10 +13076,10 @@
       </p:pic>
       <p:pic>
         <p:nvPicPr>
-          <p:cNvPr id="39" name="Graphic 38" descr="Programmer male with solid fill">
-            <a:extLst>
-              <a:ext uri="{FF2B5EF4-FFF2-40B4-BE49-F238E27FC236}">
-                <a16:creationId xmlns:a16="http://schemas.microsoft.com/office/drawing/2014/main" id="{AA85E5CD-30D7-F6D4-CD55-681D81D17D88}"/>
+          <p:cNvPr id="4" name="Graphic 3" descr="Arrow Right with solid fill">
+            <a:extLst>
+              <a:ext uri="{FF2B5EF4-FFF2-40B4-BE49-F238E27FC236}">
+                <a16:creationId xmlns:a16="http://schemas.microsoft.com/office/drawing/2014/main" id="{37126FF6-910A-FF46-AF37-3B046D58657C}"/>
               </a:ext>
             </a:extLst>
           </p:cNvPr>
@@ -13328,10 +13089,10 @@
           <p:nvPr/>
         </p:nvPicPr>
         <p:blipFill>
-          <a:blip r:embed="rId7">
+          <a:blip r:embed="rId13">
             <a:extLst>
               <a:ext uri="{96DAC541-7B7A-43D3-8B79-37D633B846F1}">
-                <asvg:svgBlip xmlns:asvg="http://schemas.microsoft.com/office/drawing/2016/SVG/main" r:embed="rId8"/>
+                <asvg:svgBlip xmlns:asvg="http://schemas.microsoft.com/office/drawing/2016/SVG/main" r:embed="rId14"/>
               </a:ext>
             </a:extLst>
           </a:blip>
@@ -13340,9 +13101,9 @@
           </a:stretch>
         </p:blipFill>
         <p:spPr>
-          <a:xfrm>
-            <a:off x="10118375" y="5193752"/>
-            <a:ext cx="526097" cy="526097"/>
+          <a:xfrm rot="10800000">
+            <a:off x="8226526" y="3956845"/>
+            <a:ext cx="1844438" cy="526100"/>
           </a:xfrm>
           <a:prstGeom prst="rect">
             <a:avLst/>
@@ -13351,10 +13112,10 @@
       </p:pic>
       <p:pic>
         <p:nvPicPr>
-          <p:cNvPr id="40" name="Graphic 39" descr="Programmer female with solid fill">
-            <a:extLst>
-              <a:ext uri="{FF2B5EF4-FFF2-40B4-BE49-F238E27FC236}">
-                <a16:creationId xmlns:a16="http://schemas.microsoft.com/office/drawing/2014/main" id="{08C0017E-5616-40A9-74D6-3BC4B02BA664}"/>
+          <p:cNvPr id="7" name="Graphic 6" descr="Arrow Right with solid fill">
+            <a:extLst>
+              <a:ext uri="{FF2B5EF4-FFF2-40B4-BE49-F238E27FC236}">
+                <a16:creationId xmlns:a16="http://schemas.microsoft.com/office/drawing/2014/main" id="{52B02B6A-1C17-4CE9-07C8-5AAF34DC3679}"/>
               </a:ext>
             </a:extLst>
           </p:cNvPr>
@@ -13364,10 +13125,10 @@
           <p:nvPr/>
         </p:nvPicPr>
         <p:blipFill>
-          <a:blip r:embed="rId9">
+          <a:blip r:embed="rId13">
             <a:extLst>
               <a:ext uri="{96DAC541-7B7A-43D3-8B79-37D633B846F1}">
-                <asvg:svgBlip xmlns:asvg="http://schemas.microsoft.com/office/drawing/2016/SVG/main" r:embed="rId10"/>
+                <asvg:svgBlip xmlns:asvg="http://schemas.microsoft.com/office/drawing/2016/SVG/main" r:embed="rId14"/>
               </a:ext>
             </a:extLst>
           </a:blip>
@@ -13377,8 +13138,8 @@
         </p:blipFill>
         <p:spPr>
           <a:xfrm>
-            <a:off x="9196230" y="6168354"/>
-            <a:ext cx="526098" cy="526098"/>
+            <a:off x="8356830" y="3753622"/>
+            <a:ext cx="1844438" cy="526100"/>
           </a:xfrm>
           <a:prstGeom prst="rect">
             <a:avLst/>
@@ -13387,10 +13148,10 @@
       </p:pic>
       <p:pic>
         <p:nvPicPr>
-          <p:cNvPr id="42" name="Graphic 41" descr="Arrow Right with solid fill">
-            <a:extLst>
-              <a:ext uri="{FF2B5EF4-FFF2-40B4-BE49-F238E27FC236}">
-                <a16:creationId xmlns:a16="http://schemas.microsoft.com/office/drawing/2014/main" id="{A0A25351-262B-64DD-99B2-E57FCE5A8B23}"/>
+          <p:cNvPr id="8" name="Graphic 7" descr="Arrow Right with solid fill">
+            <a:extLst>
+              <a:ext uri="{FF2B5EF4-FFF2-40B4-BE49-F238E27FC236}">
+                <a16:creationId xmlns:a16="http://schemas.microsoft.com/office/drawing/2014/main" id="{C524389A-CB95-08C3-4FDB-8851E9F86A74}"/>
               </a:ext>
             </a:extLst>
           </p:cNvPr>
@@ -13412,9 +13173,9 @@
           </a:stretch>
         </p:blipFill>
         <p:spPr>
-          <a:xfrm rot="20906511">
-            <a:off x="8280139" y="4467774"/>
-            <a:ext cx="840305" cy="526100"/>
+          <a:xfrm rot="9042056">
+            <a:off x="8002743" y="2653695"/>
+            <a:ext cx="1844438" cy="526100"/>
           </a:xfrm>
           <a:prstGeom prst="rect">
             <a:avLst/>
@@ -13423,10 +13184,10 @@
       </p:pic>
       <p:pic>
         <p:nvPicPr>
-          <p:cNvPr id="43" name="Graphic 42" descr="Arrow Right with solid fill">
-            <a:extLst>
-              <a:ext uri="{FF2B5EF4-FFF2-40B4-BE49-F238E27FC236}">
-                <a16:creationId xmlns:a16="http://schemas.microsoft.com/office/drawing/2014/main" id="{D1131ADB-AE29-5F91-095F-E132114599D7}"/>
+          <p:cNvPr id="9" name="Graphic 8" descr="Arrow Right with solid fill">
+            <a:extLst>
+              <a:ext uri="{FF2B5EF4-FFF2-40B4-BE49-F238E27FC236}">
+                <a16:creationId xmlns:a16="http://schemas.microsoft.com/office/drawing/2014/main" id="{0C23883B-0CE2-3C58-6FA0-CA48B62B93E0}"/>
               </a:ext>
             </a:extLst>
           </p:cNvPr>
@@ -13448,585 +13209,9 @@
           </a:stretch>
         </p:blipFill>
         <p:spPr>
-          <a:xfrm rot="10169661">
-            <a:off x="8315005" y="4633810"/>
-            <a:ext cx="840305" cy="526100"/>
-          </a:xfrm>
-          <a:prstGeom prst="rect">
-            <a:avLst/>
-          </a:prstGeom>
-        </p:spPr>
-      </p:pic>
-      <p:pic>
-        <p:nvPicPr>
-          <p:cNvPr id="44" name="Graphic 43" descr="Arrow Right with solid fill">
-            <a:extLst>
-              <a:ext uri="{FF2B5EF4-FFF2-40B4-BE49-F238E27FC236}">
-                <a16:creationId xmlns:a16="http://schemas.microsoft.com/office/drawing/2014/main" id="{C91EEC82-5782-92BE-B0F0-82924C20887F}"/>
-              </a:ext>
-            </a:extLst>
-          </p:cNvPr>
-          <p:cNvPicPr>
-            <a:picLocks noChangeAspect="1"/>
-          </p:cNvPicPr>
-          <p:nvPr/>
-        </p:nvPicPr>
-        <p:blipFill>
-          <a:blip r:embed="rId13">
-            <a:extLst>
-              <a:ext uri="{96DAC541-7B7A-43D3-8B79-37D633B846F1}">
-                <asvg:svgBlip xmlns:asvg="http://schemas.microsoft.com/office/drawing/2016/SVG/main" r:embed="rId14"/>
-              </a:ext>
-            </a:extLst>
-          </a:blip>
-          <a:stretch>
-            <a:fillRect/>
-          </a:stretch>
-        </p:blipFill>
-        <p:spPr>
-          <a:xfrm rot="10800000">
-            <a:off x="8314054" y="5396732"/>
-            <a:ext cx="1683131" cy="526100"/>
-          </a:xfrm>
-          <a:prstGeom prst="rect">
-            <a:avLst/>
-          </a:prstGeom>
-        </p:spPr>
-      </p:pic>
-      <p:pic>
-        <p:nvPicPr>
-          <p:cNvPr id="45" name="Graphic 44" descr="Arrow Right with solid fill">
-            <a:extLst>
-              <a:ext uri="{FF2B5EF4-FFF2-40B4-BE49-F238E27FC236}">
-                <a16:creationId xmlns:a16="http://schemas.microsoft.com/office/drawing/2014/main" id="{5EF381B3-9D40-3A2E-26C6-399975C10309}"/>
-              </a:ext>
-            </a:extLst>
-          </p:cNvPr>
-          <p:cNvPicPr>
-            <a:picLocks noChangeAspect="1"/>
-          </p:cNvPicPr>
-          <p:nvPr/>
-        </p:nvPicPr>
-        <p:blipFill>
-          <a:blip r:embed="rId13">
-            <a:extLst>
-              <a:ext uri="{96DAC541-7B7A-43D3-8B79-37D633B846F1}">
-                <asvg:svgBlip xmlns:asvg="http://schemas.microsoft.com/office/drawing/2016/SVG/main" r:embed="rId14"/>
-              </a:ext>
-            </a:extLst>
-          </a:blip>
-          <a:stretch>
-            <a:fillRect/>
-          </a:stretch>
-        </p:blipFill>
-        <p:spPr>
-          <a:xfrm>
-            <a:off x="8466454" y="5244332"/>
-            <a:ext cx="1683131" cy="526100"/>
-          </a:xfrm>
-          <a:prstGeom prst="rect">
-            <a:avLst/>
-          </a:prstGeom>
-        </p:spPr>
-      </p:pic>
-      <p:pic>
-        <p:nvPicPr>
-          <p:cNvPr id="46" name="Graphic 45" descr="Arrow Right with solid fill">
-            <a:extLst>
-              <a:ext uri="{FF2B5EF4-FFF2-40B4-BE49-F238E27FC236}">
-                <a16:creationId xmlns:a16="http://schemas.microsoft.com/office/drawing/2014/main" id="{4EBA2B8D-E67B-F942-6F30-AFD5B287500F}"/>
-              </a:ext>
-            </a:extLst>
-          </p:cNvPr>
-          <p:cNvPicPr>
-            <a:picLocks noChangeAspect="1"/>
-          </p:cNvPicPr>
-          <p:nvPr/>
-        </p:nvPicPr>
-        <p:blipFill>
-          <a:blip r:embed="rId13">
-            <a:extLst>
-              <a:ext uri="{96DAC541-7B7A-43D3-8B79-37D633B846F1}">
-                <asvg:svgBlip xmlns:asvg="http://schemas.microsoft.com/office/drawing/2016/SVG/main" r:embed="rId14"/>
-              </a:ext>
-            </a:extLst>
-          </a:blip>
-          <a:stretch>
-            <a:fillRect/>
-          </a:stretch>
-        </p:blipFill>
-        <p:spPr>
-          <a:xfrm rot="1139683">
-            <a:off x="8390328" y="5950803"/>
-            <a:ext cx="840305" cy="526100"/>
-          </a:xfrm>
-          <a:prstGeom prst="rect">
-            <a:avLst/>
-          </a:prstGeom>
-        </p:spPr>
-      </p:pic>
-      <p:pic>
-        <p:nvPicPr>
-          <p:cNvPr id="51" name="Graphic 50" descr="Paper with solid fill">
-            <a:extLst>
-              <a:ext uri="{FF2B5EF4-FFF2-40B4-BE49-F238E27FC236}">
-                <a16:creationId xmlns:a16="http://schemas.microsoft.com/office/drawing/2014/main" id="{C456E1F7-8B66-1AB8-15FE-2C939765B8AD}"/>
-              </a:ext>
-            </a:extLst>
-          </p:cNvPr>
-          <p:cNvPicPr>
-            <a:picLocks noChangeAspect="1"/>
-          </p:cNvPicPr>
-          <p:nvPr/>
-        </p:nvPicPr>
-        <p:blipFill>
-          <a:blip r:embed="rId15">
-            <a:extLst>
-              <a:ext uri="{96DAC541-7B7A-43D3-8B79-37D633B846F1}">
-                <asvg:svgBlip xmlns:asvg="http://schemas.microsoft.com/office/drawing/2016/SVG/main" r:embed="rId16"/>
-              </a:ext>
-            </a:extLst>
-          </a:blip>
-          <a:stretch>
-            <a:fillRect/>
-          </a:stretch>
-        </p:blipFill>
-        <p:spPr>
-          <a:xfrm>
-            <a:off x="7249317" y="4574850"/>
-            <a:ext cx="526099" cy="526099"/>
-          </a:xfrm>
-          <a:prstGeom prst="rect">
-            <a:avLst/>
-          </a:prstGeom>
-        </p:spPr>
-      </p:pic>
-      <p:pic>
-        <p:nvPicPr>
-          <p:cNvPr id="52" name="Graphic 51" descr="Document outline">
-            <a:extLst>
-              <a:ext uri="{FF2B5EF4-FFF2-40B4-BE49-F238E27FC236}">
-                <a16:creationId xmlns:a16="http://schemas.microsoft.com/office/drawing/2014/main" id="{A0671A58-FFC1-983D-0B59-15A3574599E0}"/>
-              </a:ext>
-            </a:extLst>
-          </p:cNvPr>
-          <p:cNvPicPr>
-            <a:picLocks noChangeAspect="1"/>
-          </p:cNvPicPr>
-          <p:nvPr/>
-        </p:nvPicPr>
-        <p:blipFill>
-          <a:blip r:embed="rId17">
-            <a:extLst>
-              <a:ext uri="{96DAC541-7B7A-43D3-8B79-37D633B846F1}">
-                <asvg:svgBlip xmlns:asvg="http://schemas.microsoft.com/office/drawing/2016/SVG/main" r:embed="rId18"/>
-              </a:ext>
-            </a:extLst>
-          </a:blip>
-          <a:stretch>
-            <a:fillRect/>
-          </a:stretch>
-        </p:blipFill>
-        <p:spPr>
-          <a:xfrm>
-            <a:off x="7505697" y="4588589"/>
-            <a:ext cx="526099" cy="526099"/>
-          </a:xfrm>
-          <a:prstGeom prst="rect">
-            <a:avLst/>
-          </a:prstGeom>
-        </p:spPr>
-      </p:pic>
-      <p:pic>
-        <p:nvPicPr>
-          <p:cNvPr id="53" name="Graphic 52" descr="Document with solid fill">
-            <a:extLst>
-              <a:ext uri="{FF2B5EF4-FFF2-40B4-BE49-F238E27FC236}">
-                <a16:creationId xmlns:a16="http://schemas.microsoft.com/office/drawing/2014/main" id="{A36B27B3-1946-1FFE-BF4D-EC186E9F6879}"/>
-              </a:ext>
-            </a:extLst>
-          </p:cNvPr>
-          <p:cNvPicPr>
-            <a:picLocks noChangeAspect="1"/>
-          </p:cNvPicPr>
-          <p:nvPr/>
-        </p:nvPicPr>
-        <p:blipFill>
-          <a:blip r:embed="rId11">
-            <a:extLst>
-              <a:ext uri="{96DAC541-7B7A-43D3-8B79-37D633B846F1}">
-                <asvg:svgBlip xmlns:asvg="http://schemas.microsoft.com/office/drawing/2016/SVG/main" r:embed="rId12"/>
-              </a:ext>
-            </a:extLst>
-          </a:blip>
-          <a:stretch>
-            <a:fillRect/>
-          </a:stretch>
-        </p:blipFill>
-        <p:spPr>
-          <a:xfrm>
-            <a:off x="7732186" y="4588589"/>
-            <a:ext cx="526099" cy="526099"/>
-          </a:xfrm>
-          <a:prstGeom prst="rect">
-            <a:avLst/>
-          </a:prstGeom>
-        </p:spPr>
-      </p:pic>
-      <p:pic>
-        <p:nvPicPr>
-          <p:cNvPr id="54" name="Graphic 53" descr="Paper with solid fill">
-            <a:extLst>
-              <a:ext uri="{FF2B5EF4-FFF2-40B4-BE49-F238E27FC236}">
-                <a16:creationId xmlns:a16="http://schemas.microsoft.com/office/drawing/2014/main" id="{9E3A9AA6-5E87-CB4D-6D19-C7B08BF469CF}"/>
-              </a:ext>
-            </a:extLst>
-          </p:cNvPr>
-          <p:cNvPicPr>
-            <a:picLocks noChangeAspect="1"/>
-          </p:cNvPicPr>
-          <p:nvPr/>
-        </p:nvPicPr>
-        <p:blipFill>
-          <a:blip r:embed="rId15">
-            <a:extLst>
-              <a:ext uri="{96DAC541-7B7A-43D3-8B79-37D633B846F1}">
-                <asvg:svgBlip xmlns:asvg="http://schemas.microsoft.com/office/drawing/2016/SVG/main" r:embed="rId16"/>
-              </a:ext>
-            </a:extLst>
-          </a:blip>
-          <a:stretch>
-            <a:fillRect/>
-          </a:stretch>
-        </p:blipFill>
-        <p:spPr>
-          <a:xfrm>
-            <a:off x="9722644" y="4091862"/>
-            <a:ext cx="526099" cy="526099"/>
-          </a:xfrm>
-          <a:prstGeom prst="rect">
-            <a:avLst/>
-          </a:prstGeom>
-        </p:spPr>
-      </p:pic>
-      <p:pic>
-        <p:nvPicPr>
-          <p:cNvPr id="55" name="Graphic 54" descr="Document outline">
-            <a:extLst>
-              <a:ext uri="{FF2B5EF4-FFF2-40B4-BE49-F238E27FC236}">
-                <a16:creationId xmlns:a16="http://schemas.microsoft.com/office/drawing/2014/main" id="{4611BFE4-084E-9813-12C3-68E45323FB99}"/>
-              </a:ext>
-            </a:extLst>
-          </p:cNvPr>
-          <p:cNvPicPr>
-            <a:picLocks noChangeAspect="1"/>
-          </p:cNvPicPr>
-          <p:nvPr/>
-        </p:nvPicPr>
-        <p:blipFill>
-          <a:blip r:embed="rId17">
-            <a:extLst>
-              <a:ext uri="{96DAC541-7B7A-43D3-8B79-37D633B846F1}">
-                <asvg:svgBlip xmlns:asvg="http://schemas.microsoft.com/office/drawing/2016/SVG/main" r:embed="rId18"/>
-              </a:ext>
-            </a:extLst>
-          </a:blip>
-          <a:stretch>
-            <a:fillRect/>
-          </a:stretch>
-        </p:blipFill>
-        <p:spPr>
-          <a:xfrm>
-            <a:off x="9979024" y="4105601"/>
-            <a:ext cx="526099" cy="526099"/>
-          </a:xfrm>
-          <a:prstGeom prst="rect">
-            <a:avLst/>
-          </a:prstGeom>
-        </p:spPr>
-      </p:pic>
-      <p:pic>
-        <p:nvPicPr>
-          <p:cNvPr id="56" name="Graphic 55" descr="Document with solid fill">
-            <a:extLst>
-              <a:ext uri="{FF2B5EF4-FFF2-40B4-BE49-F238E27FC236}">
-                <a16:creationId xmlns:a16="http://schemas.microsoft.com/office/drawing/2014/main" id="{04D7B922-0686-CD27-C215-6582A113FFC8}"/>
-              </a:ext>
-            </a:extLst>
-          </p:cNvPr>
-          <p:cNvPicPr>
-            <a:picLocks noChangeAspect="1"/>
-          </p:cNvPicPr>
-          <p:nvPr/>
-        </p:nvPicPr>
-        <p:blipFill>
-          <a:blip r:embed="rId11">
-            <a:extLst>
-              <a:ext uri="{96DAC541-7B7A-43D3-8B79-37D633B846F1}">
-                <asvg:svgBlip xmlns:asvg="http://schemas.microsoft.com/office/drawing/2016/SVG/main" r:embed="rId12"/>
-              </a:ext>
-            </a:extLst>
-          </a:blip>
-          <a:stretch>
-            <a:fillRect/>
-          </a:stretch>
-        </p:blipFill>
-        <p:spPr>
-          <a:xfrm>
-            <a:off x="10205513" y="4105601"/>
-            <a:ext cx="526099" cy="526099"/>
-          </a:xfrm>
-          <a:prstGeom prst="rect">
-            <a:avLst/>
-          </a:prstGeom>
-        </p:spPr>
-      </p:pic>
-      <p:pic>
-        <p:nvPicPr>
-          <p:cNvPr id="57" name="Graphic 56" descr="Paper with solid fill">
-            <a:extLst>
-              <a:ext uri="{FF2B5EF4-FFF2-40B4-BE49-F238E27FC236}">
-                <a16:creationId xmlns:a16="http://schemas.microsoft.com/office/drawing/2014/main" id="{2E507BC9-6874-3D66-DFF1-066EA391D605}"/>
-              </a:ext>
-            </a:extLst>
-          </p:cNvPr>
-          <p:cNvPicPr>
-            <a:picLocks noChangeAspect="1"/>
-          </p:cNvPicPr>
-          <p:nvPr/>
-        </p:nvPicPr>
-        <p:blipFill>
-          <a:blip r:embed="rId15">
-            <a:extLst>
-              <a:ext uri="{96DAC541-7B7A-43D3-8B79-37D633B846F1}">
-                <asvg:svgBlip xmlns:asvg="http://schemas.microsoft.com/office/drawing/2016/SVG/main" r:embed="rId16"/>
-              </a:ext>
-            </a:extLst>
-          </a:blip>
-          <a:stretch>
-            <a:fillRect/>
-          </a:stretch>
-        </p:blipFill>
-        <p:spPr>
-          <a:xfrm>
-            <a:off x="10588861" y="5190391"/>
-            <a:ext cx="526099" cy="526099"/>
-          </a:xfrm>
-          <a:prstGeom prst="rect">
-            <a:avLst/>
-          </a:prstGeom>
-        </p:spPr>
-      </p:pic>
-      <p:pic>
-        <p:nvPicPr>
-          <p:cNvPr id="58" name="Graphic 57" descr="Document outline">
-            <a:extLst>
-              <a:ext uri="{FF2B5EF4-FFF2-40B4-BE49-F238E27FC236}">
-                <a16:creationId xmlns:a16="http://schemas.microsoft.com/office/drawing/2014/main" id="{A33CF466-37ED-17D9-0976-4CCE4157E5D5}"/>
-              </a:ext>
-            </a:extLst>
-          </p:cNvPr>
-          <p:cNvPicPr>
-            <a:picLocks noChangeAspect="1"/>
-          </p:cNvPicPr>
-          <p:nvPr/>
-        </p:nvPicPr>
-        <p:blipFill>
-          <a:blip r:embed="rId17">
-            <a:extLst>
-              <a:ext uri="{96DAC541-7B7A-43D3-8B79-37D633B846F1}">
-                <asvg:svgBlip xmlns:asvg="http://schemas.microsoft.com/office/drawing/2016/SVG/main" r:embed="rId18"/>
-              </a:ext>
-            </a:extLst>
-          </a:blip>
-          <a:stretch>
-            <a:fillRect/>
-          </a:stretch>
-        </p:blipFill>
-        <p:spPr>
-          <a:xfrm>
-            <a:off x="10845241" y="5204130"/>
-            <a:ext cx="526099" cy="526099"/>
-          </a:xfrm>
-          <a:prstGeom prst="rect">
-            <a:avLst/>
-          </a:prstGeom>
-        </p:spPr>
-      </p:pic>
-      <p:pic>
-        <p:nvPicPr>
-          <p:cNvPr id="59" name="Graphic 58" descr="Document with solid fill">
-            <a:extLst>
-              <a:ext uri="{FF2B5EF4-FFF2-40B4-BE49-F238E27FC236}">
-                <a16:creationId xmlns:a16="http://schemas.microsoft.com/office/drawing/2014/main" id="{73E21536-F496-9C85-F0F6-1452EED6B622}"/>
-              </a:ext>
-            </a:extLst>
-          </p:cNvPr>
-          <p:cNvPicPr>
-            <a:picLocks noChangeAspect="1"/>
-          </p:cNvPicPr>
-          <p:nvPr/>
-        </p:nvPicPr>
-        <p:blipFill>
-          <a:blip r:embed="rId11">
-            <a:extLst>
-              <a:ext uri="{96DAC541-7B7A-43D3-8B79-37D633B846F1}">
-                <asvg:svgBlip xmlns:asvg="http://schemas.microsoft.com/office/drawing/2016/SVG/main" r:embed="rId12"/>
-              </a:ext>
-            </a:extLst>
-          </a:blip>
-          <a:stretch>
-            <a:fillRect/>
-          </a:stretch>
-        </p:blipFill>
-        <p:spPr>
-          <a:xfrm>
-            <a:off x="11071730" y="5204130"/>
-            <a:ext cx="526099" cy="526099"/>
-          </a:xfrm>
-          <a:prstGeom prst="rect">
-            <a:avLst/>
-          </a:prstGeom>
-        </p:spPr>
-      </p:pic>
-      <p:pic>
-        <p:nvPicPr>
-          <p:cNvPr id="60" name="Graphic 59" descr="Paper with solid fill">
-            <a:extLst>
-              <a:ext uri="{FF2B5EF4-FFF2-40B4-BE49-F238E27FC236}">
-                <a16:creationId xmlns:a16="http://schemas.microsoft.com/office/drawing/2014/main" id="{4FF33E26-1D98-B97A-8DBA-BDFD19480086}"/>
-              </a:ext>
-            </a:extLst>
-          </p:cNvPr>
-          <p:cNvPicPr>
-            <a:picLocks noChangeAspect="1"/>
-          </p:cNvPicPr>
-          <p:nvPr/>
-        </p:nvPicPr>
-        <p:blipFill>
-          <a:blip r:embed="rId15">
-            <a:extLst>
-              <a:ext uri="{96DAC541-7B7A-43D3-8B79-37D633B846F1}">
-                <asvg:svgBlip xmlns:asvg="http://schemas.microsoft.com/office/drawing/2016/SVG/main" r:embed="rId16"/>
-              </a:ext>
-            </a:extLst>
-          </a:blip>
-          <a:stretch>
-            <a:fillRect/>
-          </a:stretch>
-        </p:blipFill>
-        <p:spPr>
-          <a:xfrm>
-            <a:off x="9722644" y="6245254"/>
-            <a:ext cx="526099" cy="526099"/>
-          </a:xfrm>
-          <a:prstGeom prst="rect">
-            <a:avLst/>
-          </a:prstGeom>
-        </p:spPr>
-      </p:pic>
-      <p:pic>
-        <p:nvPicPr>
-          <p:cNvPr id="61" name="Graphic 60" descr="Document outline">
-            <a:extLst>
-              <a:ext uri="{FF2B5EF4-FFF2-40B4-BE49-F238E27FC236}">
-                <a16:creationId xmlns:a16="http://schemas.microsoft.com/office/drawing/2014/main" id="{9D41F617-0B8C-919B-AF7A-0FB59C22D1C8}"/>
-              </a:ext>
-            </a:extLst>
-          </p:cNvPr>
-          <p:cNvPicPr>
-            <a:picLocks noChangeAspect="1"/>
-          </p:cNvPicPr>
-          <p:nvPr/>
-        </p:nvPicPr>
-        <p:blipFill>
-          <a:blip r:embed="rId17">
-            <a:extLst>
-              <a:ext uri="{96DAC541-7B7A-43D3-8B79-37D633B846F1}">
-                <asvg:svgBlip xmlns:asvg="http://schemas.microsoft.com/office/drawing/2016/SVG/main" r:embed="rId18"/>
-              </a:ext>
-            </a:extLst>
-          </a:blip>
-          <a:stretch>
-            <a:fillRect/>
-          </a:stretch>
-        </p:blipFill>
-        <p:spPr>
-          <a:xfrm>
-            <a:off x="9979024" y="6258993"/>
-            <a:ext cx="526099" cy="526099"/>
-          </a:xfrm>
-          <a:prstGeom prst="rect">
-            <a:avLst/>
-          </a:prstGeom>
-        </p:spPr>
-      </p:pic>
-      <p:pic>
-        <p:nvPicPr>
-          <p:cNvPr id="62" name="Graphic 61" descr="Document with solid fill">
-            <a:extLst>
-              <a:ext uri="{FF2B5EF4-FFF2-40B4-BE49-F238E27FC236}">
-                <a16:creationId xmlns:a16="http://schemas.microsoft.com/office/drawing/2014/main" id="{A95C893F-3EE4-3E44-138D-BA155A201235}"/>
-              </a:ext>
-            </a:extLst>
-          </p:cNvPr>
-          <p:cNvPicPr>
-            <a:picLocks noChangeAspect="1"/>
-          </p:cNvPicPr>
-          <p:nvPr/>
-        </p:nvPicPr>
-        <p:blipFill>
-          <a:blip r:embed="rId11">
-            <a:extLst>
-              <a:ext uri="{96DAC541-7B7A-43D3-8B79-37D633B846F1}">
-                <asvg:svgBlip xmlns:asvg="http://schemas.microsoft.com/office/drawing/2016/SVG/main" r:embed="rId12"/>
-              </a:ext>
-            </a:extLst>
-          </a:blip>
-          <a:stretch>
-            <a:fillRect/>
-          </a:stretch>
-        </p:blipFill>
-        <p:spPr>
-          <a:xfrm>
-            <a:off x="10205513" y="6258993"/>
-            <a:ext cx="526099" cy="526099"/>
-          </a:xfrm>
-          <a:prstGeom prst="rect">
-            <a:avLst/>
-          </a:prstGeom>
-        </p:spPr>
-      </p:pic>
-      <p:pic>
-        <p:nvPicPr>
-          <p:cNvPr id="63" name="Graphic 62" descr="Arrow Right with solid fill">
-            <a:extLst>
-              <a:ext uri="{FF2B5EF4-FFF2-40B4-BE49-F238E27FC236}">
-                <a16:creationId xmlns:a16="http://schemas.microsoft.com/office/drawing/2014/main" id="{3CA95FDA-4638-E65D-6203-71A8D247F61B}"/>
-              </a:ext>
-            </a:extLst>
-          </p:cNvPr>
-          <p:cNvPicPr>
-            <a:picLocks noChangeAspect="1"/>
-          </p:cNvPicPr>
-          <p:nvPr/>
-        </p:nvPicPr>
-        <p:blipFill>
-          <a:blip r:embed="rId13">
-            <a:extLst>
-              <a:ext uri="{96DAC541-7B7A-43D3-8B79-37D633B846F1}">
-                <asvg:svgBlip xmlns:asvg="http://schemas.microsoft.com/office/drawing/2016/SVG/main" r:embed="rId14"/>
-              </a:ext>
-            </a:extLst>
-          </a:blip>
-          <a:stretch>
-            <a:fillRect/>
-          </a:stretch>
-        </p:blipFill>
-        <p:spPr>
-          <a:xfrm rot="12033777">
-            <a:off x="8301694" y="6076185"/>
-            <a:ext cx="840305" cy="526100"/>
+          <a:xfrm rot="19866706">
+            <a:off x="8000764" y="2390455"/>
+            <a:ext cx="1844438" cy="526100"/>
           </a:xfrm>
           <a:prstGeom prst="rect">
             <a:avLst/>
@@ -14037,6 +13222,1167 @@
     <p:extLst>
       <p:ext uri="{BB962C8B-B14F-4D97-AF65-F5344CB8AC3E}">
         <p14:creationId xmlns:p14="http://schemas.microsoft.com/office/powerpoint/2010/main" val="1235569791"/>
+      </p:ext>
+    </p:extLst>
+  </p:cSld>
+  <p:clrMapOvr>
+    <a:overrideClrMapping bg1="lt1" tx1="dk1" bg2="lt2" tx2="dk2" accent1="accent1" accent2="accent2" accent3="accent3" accent4="accent4" accent5="accent5" accent6="accent6" hlink="hlink" folHlink="folHlink"/>
+  </p:clrMapOvr>
+</p:sld>
+</file>
+
+<file path=ppt/slides/slide6.xml><?xml version="1.0" encoding="utf-8"?>
+<p:sld xmlns:a="http://schemas.openxmlformats.org/drawingml/2006/main" xmlns:r="http://schemas.openxmlformats.org/officeDocument/2006/relationships" xmlns:p="http://schemas.openxmlformats.org/presentationml/2006/main">
+  <p:cSld>
+    <p:bg>
+      <p:bgPr>
+        <a:solidFill>
+          <a:srgbClr val="B8D0CD"/>
+        </a:solidFill>
+        <a:effectLst/>
+      </p:bgPr>
+    </p:bg>
+    <p:spTree>
+      <p:nvGrpSpPr>
+        <p:cNvPr id="1" name=""/>
+        <p:cNvGrpSpPr/>
+        <p:nvPr/>
+      </p:nvGrpSpPr>
+      <p:grpSpPr>
+        <a:xfrm>
+          <a:off x="0" y="0"/>
+          <a:ext cx="0" cy="0"/>
+          <a:chOff x="0" y="0"/>
+          <a:chExt cx="0" cy="0"/>
+        </a:xfrm>
+      </p:grpSpPr>
+      <p:sp>
+        <p:nvSpPr>
+          <p:cNvPr id="2" name="Title 1">
+            <a:extLst>
+              <a:ext uri="{FF2B5EF4-FFF2-40B4-BE49-F238E27FC236}">
+                <a16:creationId xmlns:a16="http://schemas.microsoft.com/office/drawing/2014/main" id="{F75D0340-8CE0-F3FB-E4D9-39689E7622A7}"/>
+              </a:ext>
+            </a:extLst>
+          </p:cNvPr>
+          <p:cNvSpPr>
+            <a:spLocks noGrp="1"/>
+          </p:cNvSpPr>
+          <p:nvPr>
+            <p:ph type="title"/>
+          </p:nvPr>
+        </p:nvSpPr>
+        <p:spPr>
+          <a:xfrm>
+            <a:off x="838199" y="365125"/>
+            <a:ext cx="11353801" cy="1325563"/>
+          </a:xfrm>
+        </p:spPr>
+        <p:txBody>
+          <a:bodyPr/>
+          <a:lstStyle/>
+          <a:p>
+            <a:pPr eaLnBrk="1" hangingPunct="1"/>
+            <a:r>
+              <a:rPr lang="en-US" altLang="en-US" dirty="0">
+                <a:latin typeface="Calibri" panose="020F0502020204030204" pitchFamily="34" charset="0"/>
+              </a:rPr>
+              <a:t>What are the different version control systems?</a:t>
+            </a:r>
+            <a:endParaRPr lang="en-US" altLang="en-US" dirty="0"/>
+          </a:p>
+        </p:txBody>
+      </p:sp>
+      <p:sp>
+        <p:nvSpPr>
+          <p:cNvPr id="5" name="Content Placeholder 2">
+            <a:extLst>
+              <a:ext uri="{FF2B5EF4-FFF2-40B4-BE49-F238E27FC236}">
+                <a16:creationId xmlns:a16="http://schemas.microsoft.com/office/drawing/2014/main" id="{9E89BE17-59D2-1320-7115-EEDF0A59DE7E}"/>
+              </a:ext>
+            </a:extLst>
+          </p:cNvPr>
+          <p:cNvSpPr txBox="1">
+            <a:spLocks/>
+          </p:cNvSpPr>
+          <p:nvPr/>
+        </p:nvSpPr>
+        <p:spPr>
+          <a:xfrm>
+            <a:off x="991985" y="1690688"/>
+            <a:ext cx="5225936" cy="4802187"/>
+          </a:xfrm>
+          <a:prstGeom prst="rect">
+            <a:avLst/>
+          </a:prstGeom>
+        </p:spPr>
+        <p:txBody>
+          <a:bodyPr vert="horz" lIns="45720" tIns="45720" rIns="45720" bIns="45720" rtlCol="0">
+            <a:normAutofit/>
+          </a:bodyPr>
+          <a:lstStyle>
+            <a:lvl1pPr marL="228600" indent="-228600">
+              <a:lnSpc>
+                <a:spcPct val="90000"/>
+              </a:lnSpc>
+              <a:spcBef>
+                <a:spcPts val="1000"/>
+              </a:spcBef>
+              <a:buClr>
+                <a:schemeClr val="accent2"/>
+              </a:buClr>
+              <a:buFont typeface="Courier New" panose="02070309020205020404" pitchFamily="49" charset="0"/>
+              <a:buChar char="o"/>
+              <a:defRPr sz="2800">
+                <a:latin typeface="Calibri" panose="020F0502020204030204" pitchFamily="34" charset="0"/>
+              </a:defRPr>
+            </a:lvl1pPr>
+            <a:lvl2pPr marL="685800" indent="-228600">
+              <a:lnSpc>
+                <a:spcPct val="90000"/>
+              </a:lnSpc>
+              <a:spcBef>
+                <a:spcPts val="500"/>
+              </a:spcBef>
+              <a:buFont typeface="Arial" panose="020B0604020202020204" pitchFamily="34" charset="0"/>
+              <a:buChar char="•"/>
+              <a:defRPr sz="2400"/>
+            </a:lvl2pPr>
+            <a:lvl3pPr marL="1143000" indent="-228600">
+              <a:lnSpc>
+                <a:spcPct val="90000"/>
+              </a:lnSpc>
+              <a:spcBef>
+                <a:spcPts val="500"/>
+              </a:spcBef>
+              <a:buFont typeface="Arial" panose="020B0604020202020204" pitchFamily="34" charset="0"/>
+              <a:buChar char="•"/>
+              <a:defRPr sz="2000"/>
+            </a:lvl3pPr>
+            <a:lvl4pPr marL="1600200" indent="-228600">
+              <a:lnSpc>
+                <a:spcPct val="90000"/>
+              </a:lnSpc>
+              <a:spcBef>
+                <a:spcPts val="500"/>
+              </a:spcBef>
+              <a:buFont typeface="Arial" panose="020B0604020202020204" pitchFamily="34" charset="0"/>
+              <a:buChar char="•"/>
+            </a:lvl4pPr>
+            <a:lvl5pPr marL="2057400" indent="-228600">
+              <a:lnSpc>
+                <a:spcPct val="90000"/>
+              </a:lnSpc>
+              <a:spcBef>
+                <a:spcPts val="500"/>
+              </a:spcBef>
+              <a:buFont typeface="Arial" panose="020B0604020202020204" pitchFamily="34" charset="0"/>
+              <a:buChar char="•"/>
+            </a:lvl5pPr>
+            <a:lvl6pPr marL="2514600" indent="-228600">
+              <a:lnSpc>
+                <a:spcPct val="90000"/>
+              </a:lnSpc>
+              <a:spcBef>
+                <a:spcPts val="500"/>
+              </a:spcBef>
+              <a:buFont typeface="Arial" panose="020B0604020202020204" pitchFamily="34" charset="0"/>
+              <a:buChar char="•"/>
+            </a:lvl6pPr>
+            <a:lvl7pPr marL="2971800" indent="-228600">
+              <a:lnSpc>
+                <a:spcPct val="90000"/>
+              </a:lnSpc>
+              <a:spcBef>
+                <a:spcPts val="500"/>
+              </a:spcBef>
+              <a:buFont typeface="Arial" panose="020B0604020202020204" pitchFamily="34" charset="0"/>
+              <a:buChar char="•"/>
+            </a:lvl7pPr>
+            <a:lvl8pPr marL="3429000" indent="-228600">
+              <a:lnSpc>
+                <a:spcPct val="90000"/>
+              </a:lnSpc>
+              <a:spcBef>
+                <a:spcPts val="500"/>
+              </a:spcBef>
+              <a:buFont typeface="Arial" panose="020B0604020202020204" pitchFamily="34" charset="0"/>
+              <a:buChar char="•"/>
+            </a:lvl8pPr>
+            <a:lvl9pPr marL="3886200" indent="-228600">
+              <a:lnSpc>
+                <a:spcPct val="90000"/>
+              </a:lnSpc>
+              <a:spcBef>
+                <a:spcPts val="500"/>
+              </a:spcBef>
+              <a:buFont typeface="Arial" panose="020B0604020202020204" pitchFamily="34" charset="0"/>
+              <a:buChar char="•"/>
+            </a:lvl9pPr>
+          </a:lstStyle>
+          <a:p>
+            <a:r>
+              <a:rPr lang="en-US" dirty="0"/>
+              <a:t>Distributed Version Control Systems (DVCS):</a:t>
+            </a:r>
+          </a:p>
+          <a:p>
+            <a:pPr marL="0" indent="0">
+              <a:buNone/>
+            </a:pPr>
+            <a:r>
+              <a:rPr lang="en-US" dirty="0"/>
+              <a:t>Each developer has a complete copy of the codebase, including its full history, on their local machine.</a:t>
+            </a:r>
+          </a:p>
+          <a:p>
+            <a:r>
+              <a:rPr lang="en-US" dirty="0"/>
+              <a:t>Git, Mercurial.</a:t>
+            </a:r>
+          </a:p>
+        </p:txBody>
+      </p:sp>
+      <p:pic>
+        <p:nvPicPr>
+          <p:cNvPr id="3" name="Graphic 2" descr="Server with solid fill">
+            <a:extLst>
+              <a:ext uri="{FF2B5EF4-FFF2-40B4-BE49-F238E27FC236}">
+                <a16:creationId xmlns:a16="http://schemas.microsoft.com/office/drawing/2014/main" id="{58FA56B1-086B-30F3-8DC6-F1FF1F42C87F}"/>
+              </a:ext>
+            </a:extLst>
+          </p:cNvPr>
+          <p:cNvPicPr>
+            <a:picLocks noChangeAspect="1"/>
+          </p:cNvPicPr>
+          <p:nvPr/>
+        </p:nvPicPr>
+        <p:blipFill>
+          <a:blip r:embed="rId3">
+            <a:extLst>
+              <a:ext uri="{96DAC541-7B7A-43D3-8B79-37D633B846F1}">
+                <asvg:svgBlip xmlns:asvg="http://schemas.microsoft.com/office/drawing/2016/SVG/main" r:embed="rId4"/>
+              </a:ext>
+            </a:extLst>
+          </a:blip>
+          <a:stretch>
+            <a:fillRect/>
+          </a:stretch>
+        </p:blipFill>
+        <p:spPr>
+          <a:xfrm>
+            <a:off x="7040293" y="3520986"/>
+            <a:ext cx="951694" cy="951694"/>
+          </a:xfrm>
+          <a:prstGeom prst="rect">
+            <a:avLst/>
+          </a:prstGeom>
+        </p:spPr>
+      </p:pic>
+      <p:pic>
+        <p:nvPicPr>
+          <p:cNvPr id="4" name="Graphic 3" descr="Programmer male outline">
+            <a:extLst>
+              <a:ext uri="{FF2B5EF4-FFF2-40B4-BE49-F238E27FC236}">
+                <a16:creationId xmlns:a16="http://schemas.microsoft.com/office/drawing/2014/main" id="{346F7AEA-BD60-245E-50E9-88B18E5A0833}"/>
+              </a:ext>
+            </a:extLst>
+          </p:cNvPr>
+          <p:cNvPicPr>
+            <a:picLocks noChangeAspect="1"/>
+          </p:cNvPicPr>
+          <p:nvPr/>
+        </p:nvPicPr>
+        <p:blipFill>
+          <a:blip r:embed="rId5">
+            <a:extLst>
+              <a:ext uri="{96DAC541-7B7A-43D3-8B79-37D633B846F1}">
+                <asvg:svgBlip xmlns:asvg="http://schemas.microsoft.com/office/drawing/2016/SVG/main" r:embed="rId6"/>
+              </a:ext>
+            </a:extLst>
+          </a:blip>
+          <a:stretch>
+            <a:fillRect/>
+          </a:stretch>
+        </p:blipFill>
+        <p:spPr>
+          <a:xfrm>
+            <a:off x="9826201" y="1997188"/>
+            <a:ext cx="526099" cy="526099"/>
+          </a:xfrm>
+          <a:prstGeom prst="rect">
+            <a:avLst/>
+          </a:prstGeom>
+        </p:spPr>
+      </p:pic>
+      <p:pic>
+        <p:nvPicPr>
+          <p:cNvPr id="7" name="Graphic 6" descr="Programmer male with solid fill">
+            <a:extLst>
+              <a:ext uri="{FF2B5EF4-FFF2-40B4-BE49-F238E27FC236}">
+                <a16:creationId xmlns:a16="http://schemas.microsoft.com/office/drawing/2014/main" id="{0D92B4F4-7D0F-0BB3-A58D-048A9D5253ED}"/>
+              </a:ext>
+            </a:extLst>
+          </p:cNvPr>
+          <p:cNvPicPr>
+            <a:picLocks noChangeAspect="1"/>
+          </p:cNvPicPr>
+          <p:nvPr/>
+        </p:nvPicPr>
+        <p:blipFill>
+          <a:blip r:embed="rId7">
+            <a:extLst>
+              <a:ext uri="{96DAC541-7B7A-43D3-8B79-37D633B846F1}">
+                <asvg:svgBlip xmlns:asvg="http://schemas.microsoft.com/office/drawing/2016/SVG/main" r:embed="rId8"/>
+              </a:ext>
+            </a:extLst>
+          </a:blip>
+          <a:stretch>
+            <a:fillRect/>
+          </a:stretch>
+        </p:blipFill>
+        <p:spPr>
+          <a:xfrm>
+            <a:off x="10278954" y="3717997"/>
+            <a:ext cx="526097" cy="526097"/>
+          </a:xfrm>
+          <a:prstGeom prst="rect">
+            <a:avLst/>
+          </a:prstGeom>
+        </p:spPr>
+      </p:pic>
+      <p:pic>
+        <p:nvPicPr>
+          <p:cNvPr id="8" name="Graphic 7" descr="Programmer female with solid fill">
+            <a:extLst>
+              <a:ext uri="{FF2B5EF4-FFF2-40B4-BE49-F238E27FC236}">
+                <a16:creationId xmlns:a16="http://schemas.microsoft.com/office/drawing/2014/main" id="{6CEE1679-DDCF-F656-DB75-A86315276D45}"/>
+              </a:ext>
+            </a:extLst>
+          </p:cNvPr>
+          <p:cNvPicPr>
+            <a:picLocks noChangeAspect="1"/>
+          </p:cNvPicPr>
+          <p:nvPr/>
+        </p:nvPicPr>
+        <p:blipFill>
+          <a:blip r:embed="rId9">
+            <a:extLst>
+              <a:ext uri="{96DAC541-7B7A-43D3-8B79-37D633B846F1}">
+                <asvg:svgBlip xmlns:asvg="http://schemas.microsoft.com/office/drawing/2016/SVG/main" r:embed="rId10"/>
+              </a:ext>
+            </a:extLst>
+          </a:blip>
+          <a:stretch>
+            <a:fillRect/>
+          </a:stretch>
+        </p:blipFill>
+        <p:spPr>
+          <a:xfrm>
+            <a:off x="9807915" y="5225160"/>
+            <a:ext cx="526098" cy="526098"/>
+          </a:xfrm>
+          <a:prstGeom prst="rect">
+            <a:avLst/>
+          </a:prstGeom>
+        </p:spPr>
+      </p:pic>
+      <p:pic>
+        <p:nvPicPr>
+          <p:cNvPr id="10" name="Graphic 9" descr="Arrow Right with solid fill">
+            <a:extLst>
+              <a:ext uri="{FF2B5EF4-FFF2-40B4-BE49-F238E27FC236}">
+                <a16:creationId xmlns:a16="http://schemas.microsoft.com/office/drawing/2014/main" id="{F8CD07BB-6A6E-C8C1-ACF2-EF206C026161}"/>
+              </a:ext>
+            </a:extLst>
+          </p:cNvPr>
+          <p:cNvPicPr>
+            <a:picLocks noChangeAspect="1"/>
+          </p:cNvPicPr>
+          <p:nvPr/>
+        </p:nvPicPr>
+        <p:blipFill>
+          <a:blip r:embed="rId11">
+            <a:extLst>
+              <a:ext uri="{96DAC541-7B7A-43D3-8B79-37D633B846F1}">
+                <asvg:svgBlip xmlns:asvg="http://schemas.microsoft.com/office/drawing/2016/SVG/main" r:embed="rId12"/>
+              </a:ext>
+            </a:extLst>
+          </a:blip>
+          <a:stretch>
+            <a:fillRect/>
+          </a:stretch>
+        </p:blipFill>
+        <p:spPr>
+          <a:xfrm rot="1556356">
+            <a:off x="7959606" y="4728842"/>
+            <a:ext cx="1844438" cy="526100"/>
+          </a:xfrm>
+          <a:prstGeom prst="rect">
+            <a:avLst/>
+          </a:prstGeom>
+        </p:spPr>
+      </p:pic>
+      <p:pic>
+        <p:nvPicPr>
+          <p:cNvPr id="11" name="Graphic 10" descr="Paper with solid fill">
+            <a:extLst>
+              <a:ext uri="{FF2B5EF4-FFF2-40B4-BE49-F238E27FC236}">
+                <a16:creationId xmlns:a16="http://schemas.microsoft.com/office/drawing/2014/main" id="{4AA8AB98-A95C-8540-FB90-C62B9103B638}"/>
+              </a:ext>
+            </a:extLst>
+          </p:cNvPr>
+          <p:cNvPicPr>
+            <a:picLocks noChangeAspect="1"/>
+          </p:cNvPicPr>
+          <p:nvPr/>
+        </p:nvPicPr>
+        <p:blipFill>
+          <a:blip r:embed="rId13">
+            <a:extLst>
+              <a:ext uri="{96DAC541-7B7A-43D3-8B79-37D633B846F1}">
+                <asvg:svgBlip xmlns:asvg="http://schemas.microsoft.com/office/drawing/2016/SVG/main" r:embed="rId14"/>
+              </a:ext>
+            </a:extLst>
+          </a:blip>
+          <a:stretch>
+            <a:fillRect/>
+          </a:stretch>
+        </p:blipFill>
+        <p:spPr>
+          <a:xfrm>
+            <a:off x="7070447" y="2981148"/>
+            <a:ext cx="526099" cy="526099"/>
+          </a:xfrm>
+          <a:prstGeom prst="rect">
+            <a:avLst/>
+          </a:prstGeom>
+        </p:spPr>
+      </p:pic>
+      <p:pic>
+        <p:nvPicPr>
+          <p:cNvPr id="13" name="Graphic 12" descr="Document outline">
+            <a:extLst>
+              <a:ext uri="{FF2B5EF4-FFF2-40B4-BE49-F238E27FC236}">
+                <a16:creationId xmlns:a16="http://schemas.microsoft.com/office/drawing/2014/main" id="{E4B5FE68-C5F1-BD2D-32FD-C6FE4E5245B8}"/>
+              </a:ext>
+            </a:extLst>
+          </p:cNvPr>
+          <p:cNvPicPr>
+            <a:picLocks noChangeAspect="1"/>
+          </p:cNvPicPr>
+          <p:nvPr/>
+        </p:nvPicPr>
+        <p:blipFill>
+          <a:blip r:embed="rId15">
+            <a:extLst>
+              <a:ext uri="{96DAC541-7B7A-43D3-8B79-37D633B846F1}">
+                <asvg:svgBlip xmlns:asvg="http://schemas.microsoft.com/office/drawing/2016/SVG/main" r:embed="rId16"/>
+              </a:ext>
+            </a:extLst>
+          </a:blip>
+          <a:stretch>
+            <a:fillRect/>
+          </a:stretch>
+        </p:blipFill>
+        <p:spPr>
+          <a:xfrm>
+            <a:off x="7326827" y="2994887"/>
+            <a:ext cx="526099" cy="526099"/>
+          </a:xfrm>
+          <a:prstGeom prst="rect">
+            <a:avLst/>
+          </a:prstGeom>
+        </p:spPr>
+      </p:pic>
+      <p:pic>
+        <p:nvPicPr>
+          <p:cNvPr id="15" name="Graphic 14" descr="Arrow Right with solid fill">
+            <a:extLst>
+              <a:ext uri="{FF2B5EF4-FFF2-40B4-BE49-F238E27FC236}">
+                <a16:creationId xmlns:a16="http://schemas.microsoft.com/office/drawing/2014/main" id="{130E9CF9-99B9-6D9F-B272-30D5A0E331F7}"/>
+              </a:ext>
+            </a:extLst>
+          </p:cNvPr>
+          <p:cNvPicPr>
+            <a:picLocks noChangeAspect="1"/>
+          </p:cNvPicPr>
+          <p:nvPr/>
+        </p:nvPicPr>
+        <p:blipFill>
+          <a:blip r:embed="rId11">
+            <a:extLst>
+              <a:ext uri="{96DAC541-7B7A-43D3-8B79-37D633B846F1}">
+                <asvg:svgBlip xmlns:asvg="http://schemas.microsoft.com/office/drawing/2016/SVG/main" r:embed="rId12"/>
+              </a:ext>
+            </a:extLst>
+          </a:blip>
+          <a:stretch>
+            <a:fillRect/>
+          </a:stretch>
+        </p:blipFill>
+        <p:spPr>
+          <a:xfrm rot="12257988">
+            <a:off x="7844777" y="4835961"/>
+            <a:ext cx="1844438" cy="526100"/>
+          </a:xfrm>
+          <a:prstGeom prst="rect">
+            <a:avLst/>
+          </a:prstGeom>
+        </p:spPr>
+      </p:pic>
+      <p:pic>
+        <p:nvPicPr>
+          <p:cNvPr id="16" name="Graphic 15" descr="Arrow Right with solid fill">
+            <a:extLst>
+              <a:ext uri="{FF2B5EF4-FFF2-40B4-BE49-F238E27FC236}">
+                <a16:creationId xmlns:a16="http://schemas.microsoft.com/office/drawing/2014/main" id="{AEB8F5CE-EFEB-DCCC-2144-0155AA26B2DD}"/>
+              </a:ext>
+            </a:extLst>
+          </p:cNvPr>
+          <p:cNvPicPr>
+            <a:picLocks noChangeAspect="1"/>
+          </p:cNvPicPr>
+          <p:nvPr/>
+        </p:nvPicPr>
+        <p:blipFill>
+          <a:blip r:embed="rId11">
+            <a:extLst>
+              <a:ext uri="{96DAC541-7B7A-43D3-8B79-37D633B846F1}">
+                <asvg:svgBlip xmlns:asvg="http://schemas.microsoft.com/office/drawing/2016/SVG/main" r:embed="rId12"/>
+              </a:ext>
+            </a:extLst>
+          </a:blip>
+          <a:stretch>
+            <a:fillRect/>
+          </a:stretch>
+        </p:blipFill>
+        <p:spPr>
+          <a:xfrm rot="10800000">
+            <a:off x="8226526" y="3921217"/>
+            <a:ext cx="1844438" cy="526100"/>
+          </a:xfrm>
+          <a:prstGeom prst="rect">
+            <a:avLst/>
+          </a:prstGeom>
+        </p:spPr>
+      </p:pic>
+      <p:pic>
+        <p:nvPicPr>
+          <p:cNvPr id="18" name="Graphic 17" descr="Arrow Right with solid fill">
+            <a:extLst>
+              <a:ext uri="{FF2B5EF4-FFF2-40B4-BE49-F238E27FC236}">
+                <a16:creationId xmlns:a16="http://schemas.microsoft.com/office/drawing/2014/main" id="{7C8624E2-D82F-D41F-1389-0371A9D798AA}"/>
+              </a:ext>
+            </a:extLst>
+          </p:cNvPr>
+          <p:cNvPicPr>
+            <a:picLocks noChangeAspect="1"/>
+          </p:cNvPicPr>
+          <p:nvPr/>
+        </p:nvPicPr>
+        <p:blipFill>
+          <a:blip r:embed="rId11">
+            <a:extLst>
+              <a:ext uri="{96DAC541-7B7A-43D3-8B79-37D633B846F1}">
+                <asvg:svgBlip xmlns:asvg="http://schemas.microsoft.com/office/drawing/2016/SVG/main" r:embed="rId12"/>
+              </a:ext>
+            </a:extLst>
+          </a:blip>
+          <a:stretch>
+            <a:fillRect/>
+          </a:stretch>
+        </p:blipFill>
+        <p:spPr>
+          <a:xfrm>
+            <a:off x="8356830" y="3717994"/>
+            <a:ext cx="1844438" cy="526100"/>
+          </a:xfrm>
+          <a:prstGeom prst="rect">
+            <a:avLst/>
+          </a:prstGeom>
+        </p:spPr>
+      </p:pic>
+      <p:pic>
+        <p:nvPicPr>
+          <p:cNvPr id="20" name="Graphic 19" descr="Arrow Right with solid fill">
+            <a:extLst>
+              <a:ext uri="{FF2B5EF4-FFF2-40B4-BE49-F238E27FC236}">
+                <a16:creationId xmlns:a16="http://schemas.microsoft.com/office/drawing/2014/main" id="{BC9554FD-EBE0-42FB-97E3-586CB78077D1}"/>
+              </a:ext>
+            </a:extLst>
+          </p:cNvPr>
+          <p:cNvPicPr>
+            <a:picLocks noChangeAspect="1"/>
+          </p:cNvPicPr>
+          <p:nvPr/>
+        </p:nvPicPr>
+        <p:blipFill>
+          <a:blip r:embed="rId11">
+            <a:extLst>
+              <a:ext uri="{96DAC541-7B7A-43D3-8B79-37D633B846F1}">
+                <asvg:svgBlip xmlns:asvg="http://schemas.microsoft.com/office/drawing/2016/SVG/main" r:embed="rId12"/>
+              </a:ext>
+            </a:extLst>
+          </a:blip>
+          <a:stretch>
+            <a:fillRect/>
+          </a:stretch>
+        </p:blipFill>
+        <p:spPr>
+          <a:xfrm rot="9042056">
+            <a:off x="8002743" y="2618067"/>
+            <a:ext cx="1844438" cy="526100"/>
+          </a:xfrm>
+          <a:prstGeom prst="rect">
+            <a:avLst/>
+          </a:prstGeom>
+        </p:spPr>
+      </p:pic>
+      <p:pic>
+        <p:nvPicPr>
+          <p:cNvPr id="21" name="Graphic 20" descr="Arrow Right with solid fill">
+            <a:extLst>
+              <a:ext uri="{FF2B5EF4-FFF2-40B4-BE49-F238E27FC236}">
+                <a16:creationId xmlns:a16="http://schemas.microsoft.com/office/drawing/2014/main" id="{A0AA0572-B95B-D253-31E9-B1119ADA730E}"/>
+              </a:ext>
+            </a:extLst>
+          </p:cNvPr>
+          <p:cNvPicPr>
+            <a:picLocks noChangeAspect="1"/>
+          </p:cNvPicPr>
+          <p:nvPr/>
+        </p:nvPicPr>
+        <p:blipFill>
+          <a:blip r:embed="rId11">
+            <a:extLst>
+              <a:ext uri="{96DAC541-7B7A-43D3-8B79-37D633B846F1}">
+                <asvg:svgBlip xmlns:asvg="http://schemas.microsoft.com/office/drawing/2016/SVG/main" r:embed="rId12"/>
+              </a:ext>
+            </a:extLst>
+          </a:blip>
+          <a:stretch>
+            <a:fillRect/>
+          </a:stretch>
+        </p:blipFill>
+        <p:spPr>
+          <a:xfrm rot="19866706">
+            <a:off x="8000764" y="2354827"/>
+            <a:ext cx="1844438" cy="526100"/>
+          </a:xfrm>
+          <a:prstGeom prst="rect">
+            <a:avLst/>
+          </a:prstGeom>
+        </p:spPr>
+      </p:pic>
+      <p:pic>
+        <p:nvPicPr>
+          <p:cNvPr id="23" name="Graphic 22" descr="Document with solid fill">
+            <a:extLst>
+              <a:ext uri="{FF2B5EF4-FFF2-40B4-BE49-F238E27FC236}">
+                <a16:creationId xmlns:a16="http://schemas.microsoft.com/office/drawing/2014/main" id="{F436CB21-4CD1-4F11-BC10-996469CA585A}"/>
+              </a:ext>
+            </a:extLst>
+          </p:cNvPr>
+          <p:cNvPicPr>
+            <a:picLocks noChangeAspect="1"/>
+          </p:cNvPicPr>
+          <p:nvPr/>
+        </p:nvPicPr>
+        <p:blipFill>
+          <a:blip r:embed="rId17">
+            <a:extLst>
+              <a:ext uri="{96DAC541-7B7A-43D3-8B79-37D633B846F1}">
+                <asvg:svgBlip xmlns:asvg="http://schemas.microsoft.com/office/drawing/2016/SVG/main" r:embed="rId18"/>
+              </a:ext>
+            </a:extLst>
+          </a:blip>
+          <a:stretch>
+            <a:fillRect/>
+          </a:stretch>
+        </p:blipFill>
+        <p:spPr>
+          <a:xfrm>
+            <a:off x="7516140" y="3006572"/>
+            <a:ext cx="526099" cy="526099"/>
+          </a:xfrm>
+          <a:prstGeom prst="rect">
+            <a:avLst/>
+          </a:prstGeom>
+        </p:spPr>
+      </p:pic>
+      <p:pic>
+        <p:nvPicPr>
+          <p:cNvPr id="24" name="Graphic 23" descr="Paper with solid fill">
+            <a:extLst>
+              <a:ext uri="{FF2B5EF4-FFF2-40B4-BE49-F238E27FC236}">
+                <a16:creationId xmlns:a16="http://schemas.microsoft.com/office/drawing/2014/main" id="{949A3B7C-23C4-A7E3-BF71-F3FF016CE111}"/>
+              </a:ext>
+            </a:extLst>
+          </p:cNvPr>
+          <p:cNvPicPr>
+            <a:picLocks noChangeAspect="1"/>
+          </p:cNvPicPr>
+          <p:nvPr/>
+        </p:nvPicPr>
+        <p:blipFill>
+          <a:blip r:embed="rId13">
+            <a:extLst>
+              <a:ext uri="{96DAC541-7B7A-43D3-8B79-37D633B846F1}">
+                <asvg:svgBlip xmlns:asvg="http://schemas.microsoft.com/office/drawing/2016/SVG/main" r:embed="rId14"/>
+              </a:ext>
+            </a:extLst>
+          </a:blip>
+          <a:stretch>
+            <a:fillRect/>
+          </a:stretch>
+        </p:blipFill>
+        <p:spPr>
+          <a:xfrm>
+            <a:off x="10337641" y="1744624"/>
+            <a:ext cx="526099" cy="526099"/>
+          </a:xfrm>
+          <a:prstGeom prst="rect">
+            <a:avLst/>
+          </a:prstGeom>
+        </p:spPr>
+      </p:pic>
+      <p:pic>
+        <p:nvPicPr>
+          <p:cNvPr id="26" name="Graphic 25" descr="Document outline">
+            <a:extLst>
+              <a:ext uri="{FF2B5EF4-FFF2-40B4-BE49-F238E27FC236}">
+                <a16:creationId xmlns:a16="http://schemas.microsoft.com/office/drawing/2014/main" id="{072908B4-4F0F-18F7-5C5C-93763D6A5B06}"/>
+              </a:ext>
+            </a:extLst>
+          </p:cNvPr>
+          <p:cNvPicPr>
+            <a:picLocks noChangeAspect="1"/>
+          </p:cNvPicPr>
+          <p:nvPr/>
+        </p:nvPicPr>
+        <p:blipFill>
+          <a:blip r:embed="rId15">
+            <a:extLst>
+              <a:ext uri="{96DAC541-7B7A-43D3-8B79-37D633B846F1}">
+                <asvg:svgBlip xmlns:asvg="http://schemas.microsoft.com/office/drawing/2016/SVG/main" r:embed="rId16"/>
+              </a:ext>
+            </a:extLst>
+          </a:blip>
+          <a:stretch>
+            <a:fillRect/>
+          </a:stretch>
+        </p:blipFill>
+        <p:spPr>
+          <a:xfrm>
+            <a:off x="10594021" y="1758363"/>
+            <a:ext cx="526099" cy="526099"/>
+          </a:xfrm>
+          <a:prstGeom prst="rect">
+            <a:avLst/>
+          </a:prstGeom>
+        </p:spPr>
+      </p:pic>
+      <p:pic>
+        <p:nvPicPr>
+          <p:cNvPr id="27" name="Graphic 26" descr="Document with solid fill">
+            <a:extLst>
+              <a:ext uri="{FF2B5EF4-FFF2-40B4-BE49-F238E27FC236}">
+                <a16:creationId xmlns:a16="http://schemas.microsoft.com/office/drawing/2014/main" id="{27FBB21F-66C1-4714-E6C2-0DBC9F639217}"/>
+              </a:ext>
+            </a:extLst>
+          </p:cNvPr>
+          <p:cNvPicPr>
+            <a:picLocks noChangeAspect="1"/>
+          </p:cNvPicPr>
+          <p:nvPr/>
+        </p:nvPicPr>
+        <p:blipFill>
+          <a:blip r:embed="rId17">
+            <a:extLst>
+              <a:ext uri="{96DAC541-7B7A-43D3-8B79-37D633B846F1}">
+                <asvg:svgBlip xmlns:asvg="http://schemas.microsoft.com/office/drawing/2016/SVG/main" r:embed="rId18"/>
+              </a:ext>
+            </a:extLst>
+          </a:blip>
+          <a:stretch>
+            <a:fillRect/>
+          </a:stretch>
+        </p:blipFill>
+        <p:spPr>
+          <a:xfrm>
+            <a:off x="10783334" y="1770048"/>
+            <a:ext cx="526099" cy="526099"/>
+          </a:xfrm>
+          <a:prstGeom prst="rect">
+            <a:avLst/>
+          </a:prstGeom>
+        </p:spPr>
+      </p:pic>
+      <p:pic>
+        <p:nvPicPr>
+          <p:cNvPr id="28" name="Graphic 27" descr="Paper with solid fill">
+            <a:extLst>
+              <a:ext uri="{FF2B5EF4-FFF2-40B4-BE49-F238E27FC236}">
+                <a16:creationId xmlns:a16="http://schemas.microsoft.com/office/drawing/2014/main" id="{0E620E98-3CBA-F78C-0D21-035DDFCADD98}"/>
+              </a:ext>
+            </a:extLst>
+          </p:cNvPr>
+          <p:cNvPicPr>
+            <a:picLocks noChangeAspect="1"/>
+          </p:cNvPicPr>
+          <p:nvPr/>
+        </p:nvPicPr>
+        <p:blipFill>
+          <a:blip r:embed="rId13">
+            <a:extLst>
+              <a:ext uri="{96DAC541-7B7A-43D3-8B79-37D633B846F1}">
+                <asvg:svgBlip xmlns:asvg="http://schemas.microsoft.com/office/drawing/2016/SVG/main" r:embed="rId14"/>
+              </a:ext>
+            </a:extLst>
+          </a:blip>
+          <a:stretch>
+            <a:fillRect/>
+          </a:stretch>
+        </p:blipFill>
+        <p:spPr>
+          <a:xfrm>
+            <a:off x="10754322" y="3632743"/>
+            <a:ext cx="526099" cy="526099"/>
+          </a:xfrm>
+          <a:prstGeom prst="rect">
+            <a:avLst/>
+          </a:prstGeom>
+        </p:spPr>
+      </p:pic>
+      <p:pic>
+        <p:nvPicPr>
+          <p:cNvPr id="34" name="Graphic 33" descr="Document outline">
+            <a:extLst>
+              <a:ext uri="{FF2B5EF4-FFF2-40B4-BE49-F238E27FC236}">
+                <a16:creationId xmlns:a16="http://schemas.microsoft.com/office/drawing/2014/main" id="{A1A0BD20-7711-E033-87E9-FB994602F64D}"/>
+              </a:ext>
+            </a:extLst>
+          </p:cNvPr>
+          <p:cNvPicPr>
+            <a:picLocks noChangeAspect="1"/>
+          </p:cNvPicPr>
+          <p:nvPr/>
+        </p:nvPicPr>
+        <p:blipFill>
+          <a:blip r:embed="rId15">
+            <a:extLst>
+              <a:ext uri="{96DAC541-7B7A-43D3-8B79-37D633B846F1}">
+                <asvg:svgBlip xmlns:asvg="http://schemas.microsoft.com/office/drawing/2016/SVG/main" r:embed="rId16"/>
+              </a:ext>
+            </a:extLst>
+          </a:blip>
+          <a:stretch>
+            <a:fillRect/>
+          </a:stretch>
+        </p:blipFill>
+        <p:spPr>
+          <a:xfrm>
+            <a:off x="11010702" y="3646482"/>
+            <a:ext cx="526099" cy="526099"/>
+          </a:xfrm>
+          <a:prstGeom prst="rect">
+            <a:avLst/>
+          </a:prstGeom>
+        </p:spPr>
+      </p:pic>
+      <p:pic>
+        <p:nvPicPr>
+          <p:cNvPr id="36" name="Graphic 35" descr="Document with solid fill">
+            <a:extLst>
+              <a:ext uri="{FF2B5EF4-FFF2-40B4-BE49-F238E27FC236}">
+                <a16:creationId xmlns:a16="http://schemas.microsoft.com/office/drawing/2014/main" id="{5DA882E2-8F67-AA49-C932-A758499852F7}"/>
+              </a:ext>
+            </a:extLst>
+          </p:cNvPr>
+          <p:cNvPicPr>
+            <a:picLocks noChangeAspect="1"/>
+          </p:cNvPicPr>
+          <p:nvPr/>
+        </p:nvPicPr>
+        <p:blipFill>
+          <a:blip r:embed="rId17">
+            <a:extLst>
+              <a:ext uri="{96DAC541-7B7A-43D3-8B79-37D633B846F1}">
+                <asvg:svgBlip xmlns:asvg="http://schemas.microsoft.com/office/drawing/2016/SVG/main" r:embed="rId18"/>
+              </a:ext>
+            </a:extLst>
+          </a:blip>
+          <a:stretch>
+            <a:fillRect/>
+          </a:stretch>
+        </p:blipFill>
+        <p:spPr>
+          <a:xfrm>
+            <a:off x="11200015" y="3658167"/>
+            <a:ext cx="526099" cy="526099"/>
+          </a:xfrm>
+          <a:prstGeom prst="rect">
+            <a:avLst/>
+          </a:prstGeom>
+        </p:spPr>
+      </p:pic>
+      <p:pic>
+        <p:nvPicPr>
+          <p:cNvPr id="41" name="Graphic 40" descr="Paper with solid fill">
+            <a:extLst>
+              <a:ext uri="{FF2B5EF4-FFF2-40B4-BE49-F238E27FC236}">
+                <a16:creationId xmlns:a16="http://schemas.microsoft.com/office/drawing/2014/main" id="{32FE9DD7-520A-4EC3-1A53-63AB1D9716E2}"/>
+              </a:ext>
+            </a:extLst>
+          </p:cNvPr>
+          <p:cNvPicPr>
+            <a:picLocks noChangeAspect="1"/>
+          </p:cNvPicPr>
+          <p:nvPr/>
+        </p:nvPicPr>
+        <p:blipFill>
+          <a:blip r:embed="rId13">
+            <a:extLst>
+              <a:ext uri="{96DAC541-7B7A-43D3-8B79-37D633B846F1}">
+                <asvg:svgBlip xmlns:asvg="http://schemas.microsoft.com/office/drawing/2016/SVG/main" r:embed="rId14"/>
+              </a:ext>
+            </a:extLst>
+          </a:blip>
+          <a:stretch>
+            <a:fillRect/>
+          </a:stretch>
+        </p:blipFill>
+        <p:spPr>
+          <a:xfrm>
+            <a:off x="10565009" y="5341867"/>
+            <a:ext cx="526099" cy="526099"/>
+          </a:xfrm>
+          <a:prstGeom prst="rect">
+            <a:avLst/>
+          </a:prstGeom>
+        </p:spPr>
+      </p:pic>
+      <p:pic>
+        <p:nvPicPr>
+          <p:cNvPr id="47" name="Graphic 46" descr="Document outline">
+            <a:extLst>
+              <a:ext uri="{FF2B5EF4-FFF2-40B4-BE49-F238E27FC236}">
+                <a16:creationId xmlns:a16="http://schemas.microsoft.com/office/drawing/2014/main" id="{DF7A2603-ED0F-7A14-FBBB-6471C4EBEB5B}"/>
+              </a:ext>
+            </a:extLst>
+          </p:cNvPr>
+          <p:cNvPicPr>
+            <a:picLocks noChangeAspect="1"/>
+          </p:cNvPicPr>
+          <p:nvPr/>
+        </p:nvPicPr>
+        <p:blipFill>
+          <a:blip r:embed="rId15">
+            <a:extLst>
+              <a:ext uri="{96DAC541-7B7A-43D3-8B79-37D633B846F1}">
+                <asvg:svgBlip xmlns:asvg="http://schemas.microsoft.com/office/drawing/2016/SVG/main" r:embed="rId16"/>
+              </a:ext>
+            </a:extLst>
+          </a:blip>
+          <a:stretch>
+            <a:fillRect/>
+          </a:stretch>
+        </p:blipFill>
+        <p:spPr>
+          <a:xfrm>
+            <a:off x="10821389" y="5355606"/>
+            <a:ext cx="526099" cy="526099"/>
+          </a:xfrm>
+          <a:prstGeom prst="rect">
+            <a:avLst/>
+          </a:prstGeom>
+        </p:spPr>
+      </p:pic>
+      <p:pic>
+        <p:nvPicPr>
+          <p:cNvPr id="48" name="Graphic 47" descr="Document with solid fill">
+            <a:extLst>
+              <a:ext uri="{FF2B5EF4-FFF2-40B4-BE49-F238E27FC236}">
+                <a16:creationId xmlns:a16="http://schemas.microsoft.com/office/drawing/2014/main" id="{4E1B423E-5E3A-C055-F942-9CF92F5C5316}"/>
+              </a:ext>
+            </a:extLst>
+          </p:cNvPr>
+          <p:cNvPicPr>
+            <a:picLocks noChangeAspect="1"/>
+          </p:cNvPicPr>
+          <p:nvPr/>
+        </p:nvPicPr>
+        <p:blipFill>
+          <a:blip r:embed="rId17">
+            <a:extLst>
+              <a:ext uri="{96DAC541-7B7A-43D3-8B79-37D633B846F1}">
+                <asvg:svgBlip xmlns:asvg="http://schemas.microsoft.com/office/drawing/2016/SVG/main" r:embed="rId18"/>
+              </a:ext>
+            </a:extLst>
+          </a:blip>
+          <a:stretch>
+            <a:fillRect/>
+          </a:stretch>
+        </p:blipFill>
+        <p:spPr>
+          <a:xfrm>
+            <a:off x="11010702" y="5367291"/>
+            <a:ext cx="526099" cy="526099"/>
+          </a:xfrm>
+          <a:prstGeom prst="rect">
+            <a:avLst/>
+          </a:prstGeom>
+        </p:spPr>
+      </p:pic>
+      <p:pic>
+        <p:nvPicPr>
+          <p:cNvPr id="49" name="Graphic 48" descr="Arrow Right with solid fill">
+            <a:extLst>
+              <a:ext uri="{FF2B5EF4-FFF2-40B4-BE49-F238E27FC236}">
+                <a16:creationId xmlns:a16="http://schemas.microsoft.com/office/drawing/2014/main" id="{B6BE5568-1798-AAA6-5422-2C3B09487C30}"/>
+              </a:ext>
+            </a:extLst>
+          </p:cNvPr>
+          <p:cNvPicPr>
+            <a:picLocks noChangeAspect="1"/>
+          </p:cNvPicPr>
+          <p:nvPr/>
+        </p:nvPicPr>
+        <p:blipFill>
+          <a:blip r:embed="rId11">
+            <a:extLst>
+              <a:ext uri="{96DAC541-7B7A-43D3-8B79-37D633B846F1}">
+                <asvg:svgBlip xmlns:asvg="http://schemas.microsoft.com/office/drawing/2016/SVG/main" r:embed="rId12"/>
+              </a:ext>
+            </a:extLst>
+          </a:blip>
+          <a:stretch>
+            <a:fillRect/>
+          </a:stretch>
+        </p:blipFill>
+        <p:spPr>
+          <a:xfrm rot="17353480">
+            <a:off x="10166658" y="4568516"/>
+            <a:ext cx="730083" cy="526100"/>
+          </a:xfrm>
+          <a:prstGeom prst="rect">
+            <a:avLst/>
+          </a:prstGeom>
+        </p:spPr>
+      </p:pic>
+      <p:pic>
+        <p:nvPicPr>
+          <p:cNvPr id="50" name="Graphic 49" descr="Arrow Right with solid fill">
+            <a:extLst>
+              <a:ext uri="{FF2B5EF4-FFF2-40B4-BE49-F238E27FC236}">
+                <a16:creationId xmlns:a16="http://schemas.microsoft.com/office/drawing/2014/main" id="{9351AE8B-5649-C184-5F1A-ACFE05E4E723}"/>
+              </a:ext>
+            </a:extLst>
+          </p:cNvPr>
+          <p:cNvPicPr>
+            <a:picLocks noChangeAspect="1"/>
+          </p:cNvPicPr>
+          <p:nvPr/>
+        </p:nvPicPr>
+        <p:blipFill>
+          <a:blip r:embed="rId11">
+            <a:extLst>
+              <a:ext uri="{96DAC541-7B7A-43D3-8B79-37D633B846F1}">
+                <asvg:svgBlip xmlns:asvg="http://schemas.microsoft.com/office/drawing/2016/SVG/main" r:embed="rId12"/>
+              </a:ext>
+            </a:extLst>
+          </a:blip>
+          <a:stretch>
+            <a:fillRect/>
+          </a:stretch>
+        </p:blipFill>
+        <p:spPr>
+          <a:xfrm rot="6594787">
+            <a:off x="10022463" y="4521032"/>
+            <a:ext cx="694859" cy="526100"/>
+          </a:xfrm>
+          <a:prstGeom prst="rect">
+            <a:avLst/>
+          </a:prstGeom>
+        </p:spPr>
+      </p:pic>
+      <p:pic>
+        <p:nvPicPr>
+          <p:cNvPr id="64" name="Graphic 63" descr="Arrow Right with solid fill">
+            <a:extLst>
+              <a:ext uri="{FF2B5EF4-FFF2-40B4-BE49-F238E27FC236}">
+                <a16:creationId xmlns:a16="http://schemas.microsoft.com/office/drawing/2014/main" id="{00C4F86F-3124-70E1-AE60-414C88E1B0F4}"/>
+              </a:ext>
+            </a:extLst>
+          </p:cNvPr>
+          <p:cNvPicPr>
+            <a:picLocks noChangeAspect="1"/>
+          </p:cNvPicPr>
+          <p:nvPr/>
+        </p:nvPicPr>
+        <p:blipFill>
+          <a:blip r:embed="rId11">
+            <a:extLst>
+              <a:ext uri="{96DAC541-7B7A-43D3-8B79-37D633B846F1}">
+                <asvg:svgBlip xmlns:asvg="http://schemas.microsoft.com/office/drawing/2016/SVG/main" r:embed="rId12"/>
+              </a:ext>
+            </a:extLst>
+          </a:blip>
+          <a:stretch>
+            <a:fillRect/>
+          </a:stretch>
+        </p:blipFill>
+        <p:spPr>
+          <a:xfrm rot="4719254">
+            <a:off x="9985943" y="2870302"/>
+            <a:ext cx="694859" cy="526100"/>
+          </a:xfrm>
+          <a:prstGeom prst="rect">
+            <a:avLst/>
+          </a:prstGeom>
+        </p:spPr>
+      </p:pic>
+      <p:pic>
+        <p:nvPicPr>
+          <p:cNvPr id="65" name="Graphic 64" descr="Arrow Right with solid fill">
+            <a:extLst>
+              <a:ext uri="{FF2B5EF4-FFF2-40B4-BE49-F238E27FC236}">
+                <a16:creationId xmlns:a16="http://schemas.microsoft.com/office/drawing/2014/main" id="{7ADEC3F9-EE9B-3416-4100-C0726CEC2C44}"/>
+              </a:ext>
+            </a:extLst>
+          </p:cNvPr>
+          <p:cNvPicPr>
+            <a:picLocks noChangeAspect="1"/>
+          </p:cNvPicPr>
+          <p:nvPr/>
+        </p:nvPicPr>
+        <p:blipFill>
+          <a:blip r:embed="rId11">
+            <a:extLst>
+              <a:ext uri="{96DAC541-7B7A-43D3-8B79-37D633B846F1}">
+                <asvg:svgBlip xmlns:asvg="http://schemas.microsoft.com/office/drawing/2016/SVG/main" r:embed="rId12"/>
+              </a:ext>
+            </a:extLst>
+          </a:blip>
+          <a:stretch>
+            <a:fillRect/>
+          </a:stretch>
+        </p:blipFill>
+        <p:spPr>
+          <a:xfrm rot="15438955">
+            <a:off x="10167543" y="2810939"/>
+            <a:ext cx="694859" cy="526100"/>
+          </a:xfrm>
+          <a:prstGeom prst="rect">
+            <a:avLst/>
+          </a:prstGeom>
+        </p:spPr>
+      </p:pic>
+    </p:spTree>
+    <p:extLst>
+      <p:ext uri="{BB962C8B-B14F-4D97-AF65-F5344CB8AC3E}">
+        <p14:creationId xmlns:p14="http://schemas.microsoft.com/office/powerpoint/2010/main" val="465030132"/>
       </p:ext>
     </p:extLst>
   </p:cSld>
@@ -15396,4 +15742,47 @@
     </a:folHlink>
   </a:clrScheme>
 </a:themeOverride>
+</file>
+
+<file path=ppt/theme/themeOverride5.xml><?xml version="1.0" encoding="utf-8"?>
+<a:themeOverride xmlns:a="http://schemas.openxmlformats.org/drawingml/2006/main">
+  <a:clrScheme name="Office">
+    <a:dk1>
+      <a:sysClr val="windowText" lastClr="000000"/>
+    </a:dk1>
+    <a:lt1>
+      <a:sysClr val="window" lastClr="FFFFFF"/>
+    </a:lt1>
+    <a:dk2>
+      <a:srgbClr val="44546A"/>
+    </a:dk2>
+    <a:lt2>
+      <a:srgbClr val="E7E6E6"/>
+    </a:lt2>
+    <a:accent1>
+      <a:srgbClr val="4472C4"/>
+    </a:accent1>
+    <a:accent2>
+      <a:srgbClr val="ED7D31"/>
+    </a:accent2>
+    <a:accent3>
+      <a:srgbClr val="A5A5A5"/>
+    </a:accent3>
+    <a:accent4>
+      <a:srgbClr val="FFC000"/>
+    </a:accent4>
+    <a:accent5>
+      <a:srgbClr val="5B9BD5"/>
+    </a:accent5>
+    <a:accent6>
+      <a:srgbClr val="70AD47"/>
+    </a:accent6>
+    <a:hlink>
+      <a:srgbClr val="0563C1"/>
+    </a:hlink>
+    <a:folHlink>
+      <a:srgbClr val="954F72"/>
+    </a:folHlink>
+  </a:clrScheme>
+</a:themeOverride>
 </file>
</xml_diff>